<commit_message>
Last fix before the speech preparation
</commit_message>
<xml_diff>
--- a/img/celle.pptx
+++ b/img/celle.pptx
@@ -216,7 +216,7 @@
           <a:p>
             <a:fld id="{76BCBF0C-CE44-499E-BCEB-7948FB131314}" type="datetimeFigureOut">
               <a:rPr lang="it-IT" smtClean="0"/>
-              <a:t>14/02/2019</a:t>
+              <a:t>15/02/2019</a:t>
             </a:fld>
             <a:endParaRPr lang="it-IT"/>
           </a:p>
@@ -630,7 +630,7 @@
           <a:p>
             <a:fld id="{73B341DB-7226-48ED-93C6-4CA0570B6B59}" type="datetimeFigureOut">
               <a:rPr lang="it-IT" smtClean="0"/>
-              <a:t>14/02/2019</a:t>
+              <a:t>15/02/2019</a:t>
             </a:fld>
             <a:endParaRPr lang="it-IT"/>
           </a:p>
@@ -828,7 +828,7 @@
           <a:p>
             <a:fld id="{73B341DB-7226-48ED-93C6-4CA0570B6B59}" type="datetimeFigureOut">
               <a:rPr lang="it-IT" smtClean="0"/>
-              <a:t>14/02/2019</a:t>
+              <a:t>15/02/2019</a:t>
             </a:fld>
             <a:endParaRPr lang="it-IT"/>
           </a:p>
@@ -1036,7 +1036,7 @@
           <a:p>
             <a:fld id="{73B341DB-7226-48ED-93C6-4CA0570B6B59}" type="datetimeFigureOut">
               <a:rPr lang="it-IT" smtClean="0"/>
-              <a:t>14/02/2019</a:t>
+              <a:t>15/02/2019</a:t>
             </a:fld>
             <a:endParaRPr lang="it-IT"/>
           </a:p>
@@ -1256,7 +1256,7 @@
           <a:p>
             <a:fld id="{6A95F648-2F94-41D1-A59D-39CB3696F9AB}" type="datetimeFigureOut">
               <a:rPr lang="it-IT" smtClean="0"/>
-              <a:t>14/02/2019</a:t>
+              <a:t>15/02/2019</a:t>
             </a:fld>
             <a:endParaRPr lang="it-IT"/>
           </a:p>
@@ -1454,7 +1454,7 @@
           <a:p>
             <a:fld id="{6A95F648-2F94-41D1-A59D-39CB3696F9AB}" type="datetimeFigureOut">
               <a:rPr lang="it-IT" smtClean="0"/>
-              <a:t>14/02/2019</a:t>
+              <a:t>15/02/2019</a:t>
             </a:fld>
             <a:endParaRPr lang="it-IT"/>
           </a:p>
@@ -1729,7 +1729,7 @@
           <a:p>
             <a:fld id="{6A95F648-2F94-41D1-A59D-39CB3696F9AB}" type="datetimeFigureOut">
               <a:rPr lang="it-IT" smtClean="0"/>
-              <a:t>14/02/2019</a:t>
+              <a:t>15/02/2019</a:t>
             </a:fld>
             <a:endParaRPr lang="it-IT"/>
           </a:p>
@@ -1994,7 +1994,7 @@
           <a:p>
             <a:fld id="{6A95F648-2F94-41D1-A59D-39CB3696F9AB}" type="datetimeFigureOut">
               <a:rPr lang="it-IT" smtClean="0"/>
-              <a:t>14/02/2019</a:t>
+              <a:t>15/02/2019</a:t>
             </a:fld>
             <a:endParaRPr lang="it-IT"/>
           </a:p>
@@ -2406,7 +2406,7 @@
           <a:p>
             <a:fld id="{6A95F648-2F94-41D1-A59D-39CB3696F9AB}" type="datetimeFigureOut">
               <a:rPr lang="it-IT" smtClean="0"/>
-              <a:t>14/02/2019</a:t>
+              <a:t>15/02/2019</a:t>
             </a:fld>
             <a:endParaRPr lang="it-IT"/>
           </a:p>
@@ -2547,7 +2547,7 @@
           <a:p>
             <a:fld id="{6A95F648-2F94-41D1-A59D-39CB3696F9AB}" type="datetimeFigureOut">
               <a:rPr lang="it-IT" smtClean="0"/>
-              <a:t>14/02/2019</a:t>
+              <a:t>15/02/2019</a:t>
             </a:fld>
             <a:endParaRPr lang="it-IT"/>
           </a:p>
@@ -2660,7 +2660,7 @@
           <a:p>
             <a:fld id="{6A95F648-2F94-41D1-A59D-39CB3696F9AB}" type="datetimeFigureOut">
               <a:rPr lang="it-IT" smtClean="0"/>
-              <a:t>14/02/2019</a:t>
+              <a:t>15/02/2019</a:t>
             </a:fld>
             <a:endParaRPr lang="it-IT"/>
           </a:p>
@@ -2971,7 +2971,7 @@
           <a:p>
             <a:fld id="{6A95F648-2F94-41D1-A59D-39CB3696F9AB}" type="datetimeFigureOut">
               <a:rPr lang="it-IT" smtClean="0"/>
-              <a:t>14/02/2019</a:t>
+              <a:t>15/02/2019</a:t>
             </a:fld>
             <a:endParaRPr lang="it-IT"/>
           </a:p>
@@ -3169,7 +3169,7 @@
           <a:p>
             <a:fld id="{73B341DB-7226-48ED-93C6-4CA0570B6B59}" type="datetimeFigureOut">
               <a:rPr lang="it-IT" smtClean="0"/>
-              <a:t>14/02/2019</a:t>
+              <a:t>15/02/2019</a:t>
             </a:fld>
             <a:endParaRPr lang="it-IT"/>
           </a:p>
@@ -3457,7 +3457,7 @@
           <a:p>
             <a:fld id="{6A95F648-2F94-41D1-A59D-39CB3696F9AB}" type="datetimeFigureOut">
               <a:rPr lang="it-IT" smtClean="0"/>
-              <a:t>14/02/2019</a:t>
+              <a:t>15/02/2019</a:t>
             </a:fld>
             <a:endParaRPr lang="it-IT"/>
           </a:p>
@@ -3655,7 +3655,7 @@
           <a:p>
             <a:fld id="{6A95F648-2F94-41D1-A59D-39CB3696F9AB}" type="datetimeFigureOut">
               <a:rPr lang="it-IT" smtClean="0"/>
-              <a:t>14/02/2019</a:t>
+              <a:t>15/02/2019</a:t>
             </a:fld>
             <a:endParaRPr lang="it-IT"/>
           </a:p>
@@ -3863,7 +3863,7 @@
           <a:p>
             <a:fld id="{6A95F648-2F94-41D1-A59D-39CB3696F9AB}" type="datetimeFigureOut">
               <a:rPr lang="it-IT" smtClean="0"/>
-              <a:t>14/02/2019</a:t>
+              <a:t>15/02/2019</a:t>
             </a:fld>
             <a:endParaRPr lang="it-IT"/>
           </a:p>
@@ -4138,7 +4138,7 @@
           <a:p>
             <a:fld id="{73B341DB-7226-48ED-93C6-4CA0570B6B59}" type="datetimeFigureOut">
               <a:rPr lang="it-IT" smtClean="0"/>
-              <a:t>14/02/2019</a:t>
+              <a:t>15/02/2019</a:t>
             </a:fld>
             <a:endParaRPr lang="it-IT"/>
           </a:p>
@@ -4403,7 +4403,7 @@
           <a:p>
             <a:fld id="{73B341DB-7226-48ED-93C6-4CA0570B6B59}" type="datetimeFigureOut">
               <a:rPr lang="it-IT" smtClean="0"/>
-              <a:t>14/02/2019</a:t>
+              <a:t>15/02/2019</a:t>
             </a:fld>
             <a:endParaRPr lang="it-IT"/>
           </a:p>
@@ -4815,7 +4815,7 @@
           <a:p>
             <a:fld id="{73B341DB-7226-48ED-93C6-4CA0570B6B59}" type="datetimeFigureOut">
               <a:rPr lang="it-IT" smtClean="0"/>
-              <a:t>14/02/2019</a:t>
+              <a:t>15/02/2019</a:t>
             </a:fld>
             <a:endParaRPr lang="it-IT"/>
           </a:p>
@@ -4956,7 +4956,7 @@
           <a:p>
             <a:fld id="{73B341DB-7226-48ED-93C6-4CA0570B6B59}" type="datetimeFigureOut">
               <a:rPr lang="it-IT" smtClean="0"/>
-              <a:t>14/02/2019</a:t>
+              <a:t>15/02/2019</a:t>
             </a:fld>
             <a:endParaRPr lang="it-IT"/>
           </a:p>
@@ -5069,7 +5069,7 @@
           <a:p>
             <a:fld id="{73B341DB-7226-48ED-93C6-4CA0570B6B59}" type="datetimeFigureOut">
               <a:rPr lang="it-IT" smtClean="0"/>
-              <a:t>14/02/2019</a:t>
+              <a:t>15/02/2019</a:t>
             </a:fld>
             <a:endParaRPr lang="it-IT"/>
           </a:p>
@@ -5380,7 +5380,7 @@
           <a:p>
             <a:fld id="{73B341DB-7226-48ED-93C6-4CA0570B6B59}" type="datetimeFigureOut">
               <a:rPr lang="it-IT" smtClean="0"/>
-              <a:t>14/02/2019</a:t>
+              <a:t>15/02/2019</a:t>
             </a:fld>
             <a:endParaRPr lang="it-IT"/>
           </a:p>
@@ -5668,7 +5668,7 @@
           <a:p>
             <a:fld id="{73B341DB-7226-48ED-93C6-4CA0570B6B59}" type="datetimeFigureOut">
               <a:rPr lang="it-IT" smtClean="0"/>
-              <a:t>14/02/2019</a:t>
+              <a:t>15/02/2019</a:t>
             </a:fld>
             <a:endParaRPr lang="it-IT"/>
           </a:p>
@@ -5909,7 +5909,7 @@
           <a:p>
             <a:fld id="{73B341DB-7226-48ED-93C6-4CA0570B6B59}" type="datetimeFigureOut">
               <a:rPr lang="it-IT" smtClean="0"/>
-              <a:t>14/02/2019</a:t>
+              <a:t>15/02/2019</a:t>
             </a:fld>
             <a:endParaRPr lang="it-IT"/>
           </a:p>
@@ -6477,7 +6477,7 @@
           <a:p>
             <a:fld id="{6A95F648-2F94-41D1-A59D-39CB3696F9AB}" type="datetimeFigureOut">
               <a:rPr lang="it-IT" smtClean="0"/>
-              <a:t>14/02/2019</a:t>
+              <a:t>15/02/2019</a:t>
             </a:fld>
             <a:endParaRPr lang="it-IT"/>
           </a:p>
@@ -25485,86 +25485,6 @@
       </p:sp>
       <p:cxnSp>
         <p:nvCxnSpPr>
-          <p:cNvPr id="4" name="Connettore 2 3">
-            <a:extLst>
-              <a:ext uri="{FF2B5EF4-FFF2-40B4-BE49-F238E27FC236}">
-                <a16:creationId xmlns:a16="http://schemas.microsoft.com/office/drawing/2014/main" id="{C760E5D2-37B6-435D-9469-7641F049A8D0}"/>
-              </a:ext>
-            </a:extLst>
-          </p:cNvPr>
-          <p:cNvCxnSpPr/>
-          <p:nvPr/>
-        </p:nvCxnSpPr>
-        <p:spPr>
-          <a:xfrm>
-            <a:off x="1800000" y="1980000"/>
-            <a:ext cx="1980000" cy="0"/>
-          </a:xfrm>
-          <a:prstGeom prst="straightConnector1">
-            <a:avLst/>
-          </a:prstGeom>
-          <a:ln w="12700">
-            <a:headEnd type="triangle"/>
-            <a:tailEnd type="triangle"/>
-          </a:ln>
-        </p:spPr>
-        <p:style>
-          <a:lnRef idx="1">
-            <a:schemeClr val="dk1"/>
-          </a:lnRef>
-          <a:fillRef idx="0">
-            <a:schemeClr val="dk1"/>
-          </a:fillRef>
-          <a:effectRef idx="0">
-            <a:schemeClr val="dk1"/>
-          </a:effectRef>
-          <a:fontRef idx="minor">
-            <a:schemeClr val="tx1"/>
-          </a:fontRef>
-        </p:style>
-      </p:cxnSp>
-      <p:cxnSp>
-        <p:nvCxnSpPr>
-          <p:cNvPr id="29" name="Connettore 2 28">
-            <a:extLst>
-              <a:ext uri="{FF2B5EF4-FFF2-40B4-BE49-F238E27FC236}">
-                <a16:creationId xmlns:a16="http://schemas.microsoft.com/office/drawing/2014/main" id="{659CAEBD-4950-4E4A-9E4F-7B557642D29F}"/>
-              </a:ext>
-            </a:extLst>
-          </p:cNvPr>
-          <p:cNvCxnSpPr/>
-          <p:nvPr/>
-        </p:nvCxnSpPr>
-        <p:spPr>
-          <a:xfrm>
-            <a:off x="3780000" y="1980000"/>
-            <a:ext cx="1620000" cy="0"/>
-          </a:xfrm>
-          <a:prstGeom prst="straightConnector1">
-            <a:avLst/>
-          </a:prstGeom>
-          <a:ln w="12700">
-            <a:headEnd type="triangle"/>
-            <a:tailEnd type="triangle"/>
-          </a:ln>
-        </p:spPr>
-        <p:style>
-          <a:lnRef idx="1">
-            <a:schemeClr val="dk1"/>
-          </a:lnRef>
-          <a:fillRef idx="0">
-            <a:schemeClr val="dk1"/>
-          </a:fillRef>
-          <a:effectRef idx="0">
-            <a:schemeClr val="dk1"/>
-          </a:effectRef>
-          <a:fontRef idx="minor">
-            <a:schemeClr val="tx1"/>
-          </a:fontRef>
-        </p:style>
-      </p:cxnSp>
-      <p:cxnSp>
-        <p:nvCxnSpPr>
           <p:cNvPr id="23" name="Connettore diritto 22">
             <a:extLst>
               <a:ext uri="{FF2B5EF4-FFF2-40B4-BE49-F238E27FC236}">
@@ -25967,46 +25887,6 @@
           </a:prstGeom>
           <a:ln w="12700" cap="sq">
             <a:prstDash val="dash"/>
-          </a:ln>
-        </p:spPr>
-        <p:style>
-          <a:lnRef idx="1">
-            <a:schemeClr val="dk1"/>
-          </a:lnRef>
-          <a:fillRef idx="0">
-            <a:schemeClr val="dk1"/>
-          </a:fillRef>
-          <a:effectRef idx="0">
-            <a:schemeClr val="dk1"/>
-          </a:effectRef>
-          <a:fontRef idx="minor">
-            <a:schemeClr val="tx1"/>
-          </a:fontRef>
-        </p:style>
-      </p:cxnSp>
-      <p:cxnSp>
-        <p:nvCxnSpPr>
-          <p:cNvPr id="41" name="Connettore 2 40">
-            <a:extLst>
-              <a:ext uri="{FF2B5EF4-FFF2-40B4-BE49-F238E27FC236}">
-                <a16:creationId xmlns:a16="http://schemas.microsoft.com/office/drawing/2014/main" id="{5C00A0A3-F853-4F29-ADAA-159B0E1822DE}"/>
-              </a:ext>
-            </a:extLst>
-          </p:cNvPr>
-          <p:cNvCxnSpPr/>
-          <p:nvPr/>
-        </p:nvCxnSpPr>
-        <p:spPr>
-          <a:xfrm>
-            <a:off x="5400000" y="1980000"/>
-            <a:ext cx="1440000" cy="0"/>
-          </a:xfrm>
-          <a:prstGeom prst="straightConnector1">
-            <a:avLst/>
-          </a:prstGeom>
-          <a:ln w="12700">
-            <a:headEnd type="triangle"/>
-            <a:tailEnd type="triangle"/>
           </a:ln>
         </p:spPr>
         <p:style>
@@ -26417,6 +26297,126 @@
           </p:sp>
         </mc:Fallback>
       </mc:AlternateContent>
+      <p:cxnSp>
+        <p:nvCxnSpPr>
+          <p:cNvPr id="41" name="Connettore 2 40">
+            <a:extLst>
+              <a:ext uri="{FF2B5EF4-FFF2-40B4-BE49-F238E27FC236}">
+                <a16:creationId xmlns:a16="http://schemas.microsoft.com/office/drawing/2014/main" id="{5C00A0A3-F853-4F29-ADAA-159B0E1822DE}"/>
+              </a:ext>
+            </a:extLst>
+          </p:cNvPr>
+          <p:cNvCxnSpPr/>
+          <p:nvPr/>
+        </p:nvCxnSpPr>
+        <p:spPr>
+          <a:xfrm>
+            <a:off x="5400000" y="1980000"/>
+            <a:ext cx="1440000" cy="0"/>
+          </a:xfrm>
+          <a:prstGeom prst="straightConnector1">
+            <a:avLst/>
+          </a:prstGeom>
+          <a:ln w="12700">
+            <a:headEnd type="triangle"/>
+            <a:tailEnd type="triangle"/>
+          </a:ln>
+        </p:spPr>
+        <p:style>
+          <a:lnRef idx="1">
+            <a:schemeClr val="dk1"/>
+          </a:lnRef>
+          <a:fillRef idx="0">
+            <a:schemeClr val="dk1"/>
+          </a:fillRef>
+          <a:effectRef idx="0">
+            <a:schemeClr val="dk1"/>
+          </a:effectRef>
+          <a:fontRef idx="minor">
+            <a:schemeClr val="tx1"/>
+          </a:fontRef>
+        </p:style>
+      </p:cxnSp>
+      <p:cxnSp>
+        <p:nvCxnSpPr>
+          <p:cNvPr id="29" name="Connettore 2 28">
+            <a:extLst>
+              <a:ext uri="{FF2B5EF4-FFF2-40B4-BE49-F238E27FC236}">
+                <a16:creationId xmlns:a16="http://schemas.microsoft.com/office/drawing/2014/main" id="{659CAEBD-4950-4E4A-9E4F-7B557642D29F}"/>
+              </a:ext>
+            </a:extLst>
+          </p:cNvPr>
+          <p:cNvCxnSpPr/>
+          <p:nvPr/>
+        </p:nvCxnSpPr>
+        <p:spPr>
+          <a:xfrm>
+            <a:off x="3780000" y="1980000"/>
+            <a:ext cx="1620000" cy="0"/>
+          </a:xfrm>
+          <a:prstGeom prst="straightConnector1">
+            <a:avLst/>
+          </a:prstGeom>
+          <a:ln w="12700">
+            <a:headEnd type="triangle"/>
+            <a:tailEnd type="triangle"/>
+          </a:ln>
+        </p:spPr>
+        <p:style>
+          <a:lnRef idx="1">
+            <a:schemeClr val="dk1"/>
+          </a:lnRef>
+          <a:fillRef idx="0">
+            <a:schemeClr val="dk1"/>
+          </a:fillRef>
+          <a:effectRef idx="0">
+            <a:schemeClr val="dk1"/>
+          </a:effectRef>
+          <a:fontRef idx="minor">
+            <a:schemeClr val="tx1"/>
+          </a:fontRef>
+        </p:style>
+      </p:cxnSp>
+      <p:cxnSp>
+        <p:nvCxnSpPr>
+          <p:cNvPr id="4" name="Connettore 2 3">
+            <a:extLst>
+              <a:ext uri="{FF2B5EF4-FFF2-40B4-BE49-F238E27FC236}">
+                <a16:creationId xmlns:a16="http://schemas.microsoft.com/office/drawing/2014/main" id="{C760E5D2-37B6-435D-9469-7641F049A8D0}"/>
+              </a:ext>
+            </a:extLst>
+          </p:cNvPr>
+          <p:cNvCxnSpPr/>
+          <p:nvPr/>
+        </p:nvCxnSpPr>
+        <p:spPr>
+          <a:xfrm>
+            <a:off x="1800000" y="1980000"/>
+            <a:ext cx="1980000" cy="0"/>
+          </a:xfrm>
+          <a:prstGeom prst="straightConnector1">
+            <a:avLst/>
+          </a:prstGeom>
+          <a:ln w="12700">
+            <a:headEnd type="triangle"/>
+            <a:tailEnd type="triangle"/>
+          </a:ln>
+        </p:spPr>
+        <p:style>
+          <a:lnRef idx="1">
+            <a:schemeClr val="dk1"/>
+          </a:lnRef>
+          <a:fillRef idx="0">
+            <a:schemeClr val="dk1"/>
+          </a:fillRef>
+          <a:effectRef idx="0">
+            <a:schemeClr val="dk1"/>
+          </a:effectRef>
+          <a:fontRef idx="minor">
+            <a:schemeClr val="tx1"/>
+          </a:fontRef>
+        </p:style>
+      </p:cxnSp>
     </p:spTree>
     <p:extLst>
       <p:ext uri="{BB962C8B-B14F-4D97-AF65-F5344CB8AC3E}">

</xml_diff>

<commit_message>
Introduction to the obstacle problem
</commit_message>
<xml_diff>
--- a/img/celle.pptx
+++ b/img/celle.pptx
@@ -6,7 +6,7 @@
     <p:sldMasterId id="2147483660" r:id="rId2"/>
   </p:sldMasterIdLst>
   <p:notesMasterIdLst>
-    <p:notesMasterId r:id="rId31"/>
+    <p:notesMasterId r:id="rId32"/>
   </p:notesMasterIdLst>
   <p:sldIdLst>
     <p:sldId id="256" r:id="rId3"/>
@@ -22,21 +22,22 @@
     <p:sldId id="260" r:id="rId13"/>
     <p:sldId id="261" r:id="rId14"/>
     <p:sldId id="262" r:id="rId15"/>
-    <p:sldId id="263" r:id="rId16"/>
-    <p:sldId id="283" r:id="rId17"/>
-    <p:sldId id="265" r:id="rId18"/>
-    <p:sldId id="266" r:id="rId19"/>
-    <p:sldId id="270" r:id="rId20"/>
-    <p:sldId id="271" r:id="rId21"/>
-    <p:sldId id="267" r:id="rId22"/>
-    <p:sldId id="278" r:id="rId23"/>
-    <p:sldId id="279" r:id="rId24"/>
-    <p:sldId id="277" r:id="rId25"/>
-    <p:sldId id="272" r:id="rId26"/>
-    <p:sldId id="275" r:id="rId27"/>
-    <p:sldId id="276" r:id="rId28"/>
-    <p:sldId id="274" r:id="rId29"/>
-    <p:sldId id="280" r:id="rId30"/>
+    <p:sldId id="287" r:id="rId16"/>
+    <p:sldId id="263" r:id="rId17"/>
+    <p:sldId id="283" r:id="rId18"/>
+    <p:sldId id="265" r:id="rId19"/>
+    <p:sldId id="266" r:id="rId20"/>
+    <p:sldId id="270" r:id="rId21"/>
+    <p:sldId id="271" r:id="rId22"/>
+    <p:sldId id="267" r:id="rId23"/>
+    <p:sldId id="278" r:id="rId24"/>
+    <p:sldId id="279" r:id="rId25"/>
+    <p:sldId id="277" r:id="rId26"/>
+    <p:sldId id="272" r:id="rId27"/>
+    <p:sldId id="275" r:id="rId28"/>
+    <p:sldId id="276" r:id="rId29"/>
+    <p:sldId id="274" r:id="rId30"/>
+    <p:sldId id="280" r:id="rId31"/>
   </p:sldIdLst>
   <p:sldSz cx="12192000" cy="6858000"/>
   <p:notesSz cx="6858000" cy="9144000"/>
@@ -225,7 +226,7 @@
           <a:p>
             <a:fld id="{76BCBF0C-CE44-499E-BCEB-7948FB131314}" type="datetimeFigureOut">
               <a:rPr lang="it-IT" smtClean="0"/>
-              <a:t>22/03/2019</a:t>
+              <a:t>23/03/2019</a:t>
             </a:fld>
             <a:endParaRPr lang="it-IT"/>
           </a:p>
@@ -639,7 +640,7 @@
           <a:p>
             <a:fld id="{73B341DB-7226-48ED-93C6-4CA0570B6B59}" type="datetimeFigureOut">
               <a:rPr lang="it-IT" smtClean="0"/>
-              <a:t>22/03/2019</a:t>
+              <a:t>23/03/2019</a:t>
             </a:fld>
             <a:endParaRPr lang="it-IT"/>
           </a:p>
@@ -837,7 +838,7 @@
           <a:p>
             <a:fld id="{73B341DB-7226-48ED-93C6-4CA0570B6B59}" type="datetimeFigureOut">
               <a:rPr lang="it-IT" smtClean="0"/>
-              <a:t>22/03/2019</a:t>
+              <a:t>23/03/2019</a:t>
             </a:fld>
             <a:endParaRPr lang="it-IT"/>
           </a:p>
@@ -1045,7 +1046,7 @@
           <a:p>
             <a:fld id="{73B341DB-7226-48ED-93C6-4CA0570B6B59}" type="datetimeFigureOut">
               <a:rPr lang="it-IT" smtClean="0"/>
-              <a:t>22/03/2019</a:t>
+              <a:t>23/03/2019</a:t>
             </a:fld>
             <a:endParaRPr lang="it-IT"/>
           </a:p>
@@ -1265,7 +1266,7 @@
           <a:p>
             <a:fld id="{6A95F648-2F94-41D1-A59D-39CB3696F9AB}" type="datetimeFigureOut">
               <a:rPr lang="it-IT" smtClean="0"/>
-              <a:t>22/03/2019</a:t>
+              <a:t>23/03/2019</a:t>
             </a:fld>
             <a:endParaRPr lang="it-IT"/>
           </a:p>
@@ -1463,7 +1464,7 @@
           <a:p>
             <a:fld id="{6A95F648-2F94-41D1-A59D-39CB3696F9AB}" type="datetimeFigureOut">
               <a:rPr lang="it-IT" smtClean="0"/>
-              <a:t>22/03/2019</a:t>
+              <a:t>23/03/2019</a:t>
             </a:fld>
             <a:endParaRPr lang="it-IT"/>
           </a:p>
@@ -1738,7 +1739,7 @@
           <a:p>
             <a:fld id="{6A95F648-2F94-41D1-A59D-39CB3696F9AB}" type="datetimeFigureOut">
               <a:rPr lang="it-IT" smtClean="0"/>
-              <a:t>22/03/2019</a:t>
+              <a:t>23/03/2019</a:t>
             </a:fld>
             <a:endParaRPr lang="it-IT"/>
           </a:p>
@@ -2003,7 +2004,7 @@
           <a:p>
             <a:fld id="{6A95F648-2F94-41D1-A59D-39CB3696F9AB}" type="datetimeFigureOut">
               <a:rPr lang="it-IT" smtClean="0"/>
-              <a:t>22/03/2019</a:t>
+              <a:t>23/03/2019</a:t>
             </a:fld>
             <a:endParaRPr lang="it-IT"/>
           </a:p>
@@ -2415,7 +2416,7 @@
           <a:p>
             <a:fld id="{6A95F648-2F94-41D1-A59D-39CB3696F9AB}" type="datetimeFigureOut">
               <a:rPr lang="it-IT" smtClean="0"/>
-              <a:t>22/03/2019</a:t>
+              <a:t>23/03/2019</a:t>
             </a:fld>
             <a:endParaRPr lang="it-IT"/>
           </a:p>
@@ -2556,7 +2557,7 @@
           <a:p>
             <a:fld id="{6A95F648-2F94-41D1-A59D-39CB3696F9AB}" type="datetimeFigureOut">
               <a:rPr lang="it-IT" smtClean="0"/>
-              <a:t>22/03/2019</a:t>
+              <a:t>23/03/2019</a:t>
             </a:fld>
             <a:endParaRPr lang="it-IT"/>
           </a:p>
@@ -2669,7 +2670,7 @@
           <a:p>
             <a:fld id="{6A95F648-2F94-41D1-A59D-39CB3696F9AB}" type="datetimeFigureOut">
               <a:rPr lang="it-IT" smtClean="0"/>
-              <a:t>22/03/2019</a:t>
+              <a:t>23/03/2019</a:t>
             </a:fld>
             <a:endParaRPr lang="it-IT"/>
           </a:p>
@@ -2980,7 +2981,7 @@
           <a:p>
             <a:fld id="{6A95F648-2F94-41D1-A59D-39CB3696F9AB}" type="datetimeFigureOut">
               <a:rPr lang="it-IT" smtClean="0"/>
-              <a:t>22/03/2019</a:t>
+              <a:t>23/03/2019</a:t>
             </a:fld>
             <a:endParaRPr lang="it-IT"/>
           </a:p>
@@ -3178,7 +3179,7 @@
           <a:p>
             <a:fld id="{73B341DB-7226-48ED-93C6-4CA0570B6B59}" type="datetimeFigureOut">
               <a:rPr lang="it-IT" smtClean="0"/>
-              <a:t>22/03/2019</a:t>
+              <a:t>23/03/2019</a:t>
             </a:fld>
             <a:endParaRPr lang="it-IT"/>
           </a:p>
@@ -3466,7 +3467,7 @@
           <a:p>
             <a:fld id="{6A95F648-2F94-41D1-A59D-39CB3696F9AB}" type="datetimeFigureOut">
               <a:rPr lang="it-IT" smtClean="0"/>
-              <a:t>22/03/2019</a:t>
+              <a:t>23/03/2019</a:t>
             </a:fld>
             <a:endParaRPr lang="it-IT"/>
           </a:p>
@@ -3664,7 +3665,7 @@
           <a:p>
             <a:fld id="{6A95F648-2F94-41D1-A59D-39CB3696F9AB}" type="datetimeFigureOut">
               <a:rPr lang="it-IT" smtClean="0"/>
-              <a:t>22/03/2019</a:t>
+              <a:t>23/03/2019</a:t>
             </a:fld>
             <a:endParaRPr lang="it-IT"/>
           </a:p>
@@ -3872,7 +3873,7 @@
           <a:p>
             <a:fld id="{6A95F648-2F94-41D1-A59D-39CB3696F9AB}" type="datetimeFigureOut">
               <a:rPr lang="it-IT" smtClean="0"/>
-              <a:t>22/03/2019</a:t>
+              <a:t>23/03/2019</a:t>
             </a:fld>
             <a:endParaRPr lang="it-IT"/>
           </a:p>
@@ -4147,7 +4148,7 @@
           <a:p>
             <a:fld id="{73B341DB-7226-48ED-93C6-4CA0570B6B59}" type="datetimeFigureOut">
               <a:rPr lang="it-IT" smtClean="0"/>
-              <a:t>22/03/2019</a:t>
+              <a:t>23/03/2019</a:t>
             </a:fld>
             <a:endParaRPr lang="it-IT"/>
           </a:p>
@@ -4412,7 +4413,7 @@
           <a:p>
             <a:fld id="{73B341DB-7226-48ED-93C6-4CA0570B6B59}" type="datetimeFigureOut">
               <a:rPr lang="it-IT" smtClean="0"/>
-              <a:t>22/03/2019</a:t>
+              <a:t>23/03/2019</a:t>
             </a:fld>
             <a:endParaRPr lang="it-IT"/>
           </a:p>
@@ -4824,7 +4825,7 @@
           <a:p>
             <a:fld id="{73B341DB-7226-48ED-93C6-4CA0570B6B59}" type="datetimeFigureOut">
               <a:rPr lang="it-IT" smtClean="0"/>
-              <a:t>22/03/2019</a:t>
+              <a:t>23/03/2019</a:t>
             </a:fld>
             <a:endParaRPr lang="it-IT"/>
           </a:p>
@@ -4965,7 +4966,7 @@
           <a:p>
             <a:fld id="{73B341DB-7226-48ED-93C6-4CA0570B6B59}" type="datetimeFigureOut">
               <a:rPr lang="it-IT" smtClean="0"/>
-              <a:t>22/03/2019</a:t>
+              <a:t>23/03/2019</a:t>
             </a:fld>
             <a:endParaRPr lang="it-IT"/>
           </a:p>
@@ -5078,7 +5079,7 @@
           <a:p>
             <a:fld id="{73B341DB-7226-48ED-93C6-4CA0570B6B59}" type="datetimeFigureOut">
               <a:rPr lang="it-IT" smtClean="0"/>
-              <a:t>22/03/2019</a:t>
+              <a:t>23/03/2019</a:t>
             </a:fld>
             <a:endParaRPr lang="it-IT"/>
           </a:p>
@@ -5389,7 +5390,7 @@
           <a:p>
             <a:fld id="{73B341DB-7226-48ED-93C6-4CA0570B6B59}" type="datetimeFigureOut">
               <a:rPr lang="it-IT" smtClean="0"/>
-              <a:t>22/03/2019</a:t>
+              <a:t>23/03/2019</a:t>
             </a:fld>
             <a:endParaRPr lang="it-IT"/>
           </a:p>
@@ -5677,7 +5678,7 @@
           <a:p>
             <a:fld id="{73B341DB-7226-48ED-93C6-4CA0570B6B59}" type="datetimeFigureOut">
               <a:rPr lang="it-IT" smtClean="0"/>
-              <a:t>22/03/2019</a:t>
+              <a:t>23/03/2019</a:t>
             </a:fld>
             <a:endParaRPr lang="it-IT"/>
           </a:p>
@@ -5918,7 +5919,7 @@
           <a:p>
             <a:fld id="{73B341DB-7226-48ED-93C6-4CA0570B6B59}" type="datetimeFigureOut">
               <a:rPr lang="it-IT" smtClean="0"/>
-              <a:t>22/03/2019</a:t>
+              <a:t>23/03/2019</a:t>
             </a:fld>
             <a:endParaRPr lang="it-IT"/>
           </a:p>
@@ -6486,7 +6487,7 @@
           <a:p>
             <a:fld id="{6A95F648-2F94-41D1-A59D-39CB3696F9AB}" type="datetimeFigureOut">
               <a:rPr lang="it-IT" smtClean="0"/>
-              <a:t>22/03/2019</a:t>
+              <a:t>23/03/2019</a:t>
             </a:fld>
             <a:endParaRPr lang="it-IT"/>
           </a:p>
@@ -16587,6 +16588,2067 @@
       </p:grpSpPr>
       <p:sp>
         <p:nvSpPr>
+          <p:cNvPr id="33" name="CasellaDiTesto 32">
+            <a:extLst>
+              <a:ext uri="{FF2B5EF4-FFF2-40B4-BE49-F238E27FC236}">
+                <a16:creationId xmlns:a16="http://schemas.microsoft.com/office/drawing/2014/main" id="{BFBCDCC2-3F58-44C0-AA24-9178A0DAD21C}"/>
+              </a:ext>
+            </a:extLst>
+          </p:cNvPr>
+          <p:cNvSpPr txBox="1"/>
+          <p:nvPr/>
+        </p:nvSpPr>
+        <p:spPr>
+          <a:xfrm>
+            <a:off x="6114600" y="464876"/>
+            <a:ext cx="720000" cy="338554"/>
+          </a:xfrm>
+          <a:prstGeom prst="rect">
+            <a:avLst/>
+          </a:prstGeom>
+          <a:noFill/>
+        </p:spPr>
+        <p:txBody>
+          <a:bodyPr wrap="square" rtlCol="0">
+            <a:spAutoFit/>
+          </a:bodyPr>
+          <a:lstStyle/>
+          <a:p>
+            <a:pPr algn="ctr"/>
+            <a:r>
+              <a:rPr lang="it-IT" sz="1600" dirty="0"/>
+              <a:t>0.5 m</a:t>
+            </a:r>
+          </a:p>
+        </p:txBody>
+      </p:sp>
+      <p:cxnSp>
+        <p:nvCxnSpPr>
+          <p:cNvPr id="5" name="Connettore diritto 4">
+            <a:extLst>
+              <a:ext uri="{FF2B5EF4-FFF2-40B4-BE49-F238E27FC236}">
+                <a16:creationId xmlns:a16="http://schemas.microsoft.com/office/drawing/2014/main" id="{E452E3E4-5917-4DBC-AD34-4A62D67B7B8D}"/>
+              </a:ext>
+            </a:extLst>
+          </p:cNvPr>
+          <p:cNvCxnSpPr/>
+          <p:nvPr/>
+        </p:nvCxnSpPr>
+        <p:spPr>
+          <a:xfrm>
+            <a:off x="360000" y="360000"/>
+            <a:ext cx="7920000" cy="0"/>
+          </a:xfrm>
+          <a:prstGeom prst="line">
+            <a:avLst/>
+          </a:prstGeom>
+          <a:ln w="12700" cap="sq"/>
+        </p:spPr>
+        <p:style>
+          <a:lnRef idx="1">
+            <a:schemeClr val="dk1"/>
+          </a:lnRef>
+          <a:fillRef idx="0">
+            <a:schemeClr val="dk1"/>
+          </a:fillRef>
+          <a:effectRef idx="0">
+            <a:schemeClr val="dk1"/>
+          </a:effectRef>
+          <a:fontRef idx="minor">
+            <a:schemeClr val="tx1"/>
+          </a:fontRef>
+        </p:style>
+      </p:cxnSp>
+      <p:cxnSp>
+        <p:nvCxnSpPr>
+          <p:cNvPr id="7" name="Connettore diritto 6">
+            <a:extLst>
+              <a:ext uri="{FF2B5EF4-FFF2-40B4-BE49-F238E27FC236}">
+                <a16:creationId xmlns:a16="http://schemas.microsoft.com/office/drawing/2014/main" id="{A6748D5F-8E80-4466-80F2-778883C958B0}"/>
+              </a:ext>
+            </a:extLst>
+          </p:cNvPr>
+          <p:cNvCxnSpPr/>
+          <p:nvPr/>
+        </p:nvCxnSpPr>
+        <p:spPr>
+          <a:xfrm>
+            <a:off x="360000" y="360000"/>
+            <a:ext cx="0" cy="864000"/>
+          </a:xfrm>
+          <a:prstGeom prst="line">
+            <a:avLst/>
+          </a:prstGeom>
+          <a:ln w="12700" cap="sq">
+            <a:solidFill>
+              <a:schemeClr val="tx1"/>
+            </a:solidFill>
+          </a:ln>
+        </p:spPr>
+        <p:style>
+          <a:lnRef idx="1">
+            <a:schemeClr val="accent1"/>
+          </a:lnRef>
+          <a:fillRef idx="0">
+            <a:schemeClr val="accent1"/>
+          </a:fillRef>
+          <a:effectRef idx="0">
+            <a:schemeClr val="accent1"/>
+          </a:effectRef>
+          <a:fontRef idx="minor">
+            <a:schemeClr val="tx1"/>
+          </a:fontRef>
+        </p:style>
+      </p:cxnSp>
+      <p:cxnSp>
+        <p:nvCxnSpPr>
+          <p:cNvPr id="8" name="Connettore diritto 7">
+            <a:extLst>
+              <a:ext uri="{FF2B5EF4-FFF2-40B4-BE49-F238E27FC236}">
+                <a16:creationId xmlns:a16="http://schemas.microsoft.com/office/drawing/2014/main" id="{FCA060FE-2D39-4500-AED6-A2017E21CAAB}"/>
+              </a:ext>
+            </a:extLst>
+          </p:cNvPr>
+          <p:cNvCxnSpPr/>
+          <p:nvPr/>
+        </p:nvCxnSpPr>
+        <p:spPr>
+          <a:xfrm>
+            <a:off x="8280000" y="360000"/>
+            <a:ext cx="0" cy="864000"/>
+          </a:xfrm>
+          <a:prstGeom prst="line">
+            <a:avLst/>
+          </a:prstGeom>
+          <a:ln w="12700" cap="sq">
+            <a:solidFill>
+              <a:schemeClr val="tx1"/>
+            </a:solidFill>
+          </a:ln>
+        </p:spPr>
+        <p:style>
+          <a:lnRef idx="1">
+            <a:schemeClr val="accent1"/>
+          </a:lnRef>
+          <a:fillRef idx="0">
+            <a:schemeClr val="accent1"/>
+          </a:fillRef>
+          <a:effectRef idx="0">
+            <a:schemeClr val="accent1"/>
+          </a:effectRef>
+          <a:fontRef idx="minor">
+            <a:schemeClr val="tx1"/>
+          </a:fontRef>
+        </p:style>
+      </p:cxnSp>
+      <p:cxnSp>
+        <p:nvCxnSpPr>
+          <p:cNvPr id="9" name="Connettore diritto 8">
+            <a:extLst>
+              <a:ext uri="{FF2B5EF4-FFF2-40B4-BE49-F238E27FC236}">
+                <a16:creationId xmlns:a16="http://schemas.microsoft.com/office/drawing/2014/main" id="{44E9C63B-2422-4843-8F90-1C07DFF81060}"/>
+              </a:ext>
+            </a:extLst>
+          </p:cNvPr>
+          <p:cNvCxnSpPr/>
+          <p:nvPr/>
+        </p:nvCxnSpPr>
+        <p:spPr>
+          <a:xfrm>
+            <a:off x="360000" y="1224000"/>
+            <a:ext cx="5760000" cy="0"/>
+          </a:xfrm>
+          <a:prstGeom prst="line">
+            <a:avLst/>
+          </a:prstGeom>
+          <a:ln w="12700" cap="sq"/>
+        </p:spPr>
+        <p:style>
+          <a:lnRef idx="1">
+            <a:schemeClr val="dk1"/>
+          </a:lnRef>
+          <a:fillRef idx="0">
+            <a:schemeClr val="dk1"/>
+          </a:fillRef>
+          <a:effectRef idx="0">
+            <a:schemeClr val="dk1"/>
+          </a:effectRef>
+          <a:fontRef idx="minor">
+            <a:schemeClr val="tx1"/>
+          </a:fontRef>
+        </p:style>
+      </p:cxnSp>
+      <p:cxnSp>
+        <p:nvCxnSpPr>
+          <p:cNvPr id="12" name="Connettore diritto 11">
+            <a:extLst>
+              <a:ext uri="{FF2B5EF4-FFF2-40B4-BE49-F238E27FC236}">
+                <a16:creationId xmlns:a16="http://schemas.microsoft.com/office/drawing/2014/main" id="{9D4A782E-E9AE-485A-9391-31209AB5A40D}"/>
+              </a:ext>
+            </a:extLst>
+          </p:cNvPr>
+          <p:cNvCxnSpPr/>
+          <p:nvPr/>
+        </p:nvCxnSpPr>
+        <p:spPr>
+          <a:xfrm>
+            <a:off x="6840000" y="1080000"/>
+            <a:ext cx="0" cy="144000"/>
+          </a:xfrm>
+          <a:prstGeom prst="line">
+            <a:avLst/>
+          </a:prstGeom>
+          <a:ln w="12700" cap="sq">
+            <a:solidFill>
+              <a:srgbClr val="FF0000"/>
+            </a:solidFill>
+          </a:ln>
+        </p:spPr>
+        <p:style>
+          <a:lnRef idx="1">
+            <a:schemeClr val="accent1"/>
+          </a:lnRef>
+          <a:fillRef idx="0">
+            <a:schemeClr val="accent1"/>
+          </a:fillRef>
+          <a:effectRef idx="0">
+            <a:schemeClr val="accent1"/>
+          </a:effectRef>
+          <a:fontRef idx="minor">
+            <a:schemeClr val="tx1"/>
+          </a:fontRef>
+        </p:style>
+      </p:cxnSp>
+      <p:cxnSp>
+        <p:nvCxnSpPr>
+          <p:cNvPr id="14" name="Connettore 2 13">
+            <a:extLst>
+              <a:ext uri="{FF2B5EF4-FFF2-40B4-BE49-F238E27FC236}">
+                <a16:creationId xmlns:a16="http://schemas.microsoft.com/office/drawing/2014/main" id="{5AE849D6-C726-4526-8326-CD22A3AFE0B5}"/>
+              </a:ext>
+            </a:extLst>
+          </p:cNvPr>
+          <p:cNvCxnSpPr/>
+          <p:nvPr/>
+        </p:nvCxnSpPr>
+        <p:spPr>
+          <a:xfrm>
+            <a:off x="360000" y="720000"/>
+            <a:ext cx="5760000" cy="0"/>
+          </a:xfrm>
+          <a:prstGeom prst="straightConnector1">
+            <a:avLst/>
+          </a:prstGeom>
+          <a:ln w="12700">
+            <a:solidFill>
+              <a:schemeClr val="tx1"/>
+            </a:solidFill>
+            <a:headEnd type="triangle"/>
+            <a:tailEnd type="triangle"/>
+          </a:ln>
+        </p:spPr>
+        <p:style>
+          <a:lnRef idx="1">
+            <a:schemeClr val="accent1"/>
+          </a:lnRef>
+          <a:fillRef idx="0">
+            <a:schemeClr val="accent1"/>
+          </a:fillRef>
+          <a:effectRef idx="0">
+            <a:schemeClr val="accent1"/>
+          </a:effectRef>
+          <a:fontRef idx="minor">
+            <a:schemeClr val="tx1"/>
+          </a:fontRef>
+        </p:style>
+      </p:cxnSp>
+      <p:cxnSp>
+        <p:nvCxnSpPr>
+          <p:cNvPr id="16" name="Connettore 2 15">
+            <a:extLst>
+              <a:ext uri="{FF2B5EF4-FFF2-40B4-BE49-F238E27FC236}">
+                <a16:creationId xmlns:a16="http://schemas.microsoft.com/office/drawing/2014/main" id="{F9611C99-F4B3-43AD-9B20-D7F5C718EF1A}"/>
+              </a:ext>
+            </a:extLst>
+          </p:cNvPr>
+          <p:cNvCxnSpPr/>
+          <p:nvPr/>
+        </p:nvCxnSpPr>
+        <p:spPr>
+          <a:xfrm>
+            <a:off x="1440000" y="360000"/>
+            <a:ext cx="0" cy="864000"/>
+          </a:xfrm>
+          <a:prstGeom prst="straightConnector1">
+            <a:avLst/>
+          </a:prstGeom>
+          <a:ln w="12700">
+            <a:solidFill>
+              <a:schemeClr val="tx1"/>
+            </a:solidFill>
+            <a:headEnd type="triangle"/>
+            <a:tailEnd type="triangle"/>
+          </a:ln>
+        </p:spPr>
+        <p:style>
+          <a:lnRef idx="1">
+            <a:schemeClr val="accent1"/>
+          </a:lnRef>
+          <a:fillRef idx="0">
+            <a:schemeClr val="accent1"/>
+          </a:fillRef>
+          <a:effectRef idx="0">
+            <a:schemeClr val="accent1"/>
+          </a:effectRef>
+          <a:fontRef idx="minor">
+            <a:schemeClr val="tx1"/>
+          </a:fontRef>
+        </p:style>
+      </p:cxnSp>
+      <p:cxnSp>
+        <p:nvCxnSpPr>
+          <p:cNvPr id="17" name="Connettore 2 16">
+            <a:extLst>
+              <a:ext uri="{FF2B5EF4-FFF2-40B4-BE49-F238E27FC236}">
+                <a16:creationId xmlns:a16="http://schemas.microsoft.com/office/drawing/2014/main" id="{3C4CB22D-F89F-4AFF-9E4A-6EB304E21FF0}"/>
+              </a:ext>
+            </a:extLst>
+          </p:cNvPr>
+          <p:cNvCxnSpPr/>
+          <p:nvPr/>
+        </p:nvCxnSpPr>
+        <p:spPr>
+          <a:xfrm>
+            <a:off x="5191899" y="1080000"/>
+            <a:ext cx="0" cy="144000"/>
+          </a:xfrm>
+          <a:prstGeom prst="straightConnector1">
+            <a:avLst/>
+          </a:prstGeom>
+          <a:ln>
+            <a:solidFill>
+              <a:schemeClr val="tx1"/>
+            </a:solidFill>
+            <a:headEnd type="triangle"/>
+            <a:tailEnd type="triangle"/>
+          </a:ln>
+        </p:spPr>
+        <p:style>
+          <a:lnRef idx="1">
+            <a:schemeClr val="accent1"/>
+          </a:lnRef>
+          <a:fillRef idx="0">
+            <a:schemeClr val="accent1"/>
+          </a:fillRef>
+          <a:effectRef idx="0">
+            <a:schemeClr val="accent1"/>
+          </a:effectRef>
+          <a:fontRef idx="minor">
+            <a:schemeClr val="tx1"/>
+          </a:fontRef>
+        </p:style>
+      </p:cxnSp>
+      <mc:AlternateContent xmlns:mc="http://schemas.openxmlformats.org/markup-compatibility/2006">
+        <mc:Choice xmlns:a14="http://schemas.microsoft.com/office/drawing/2010/main" Requires="a14">
+          <p:sp>
+            <p:nvSpPr>
+              <p:cNvPr id="18" name="CasellaDiTesto 17">
+                <a:extLst>
+                  <a:ext uri="{FF2B5EF4-FFF2-40B4-BE49-F238E27FC236}">
+                    <a16:creationId xmlns:a16="http://schemas.microsoft.com/office/drawing/2014/main" id="{12C1ED30-8A01-4170-ACC0-408D041CAF54}"/>
+                  </a:ext>
+                </a:extLst>
+              </p:cNvPr>
+              <p:cNvSpPr txBox="1"/>
+              <p:nvPr/>
+            </p:nvSpPr>
+            <p:spPr>
+              <a:xfrm>
+                <a:off x="7825797" y="809803"/>
+                <a:ext cx="540000" cy="369332"/>
+              </a:xfrm>
+              <a:prstGeom prst="rect">
+                <a:avLst/>
+              </a:prstGeom>
+              <a:noFill/>
+            </p:spPr>
+            <p:txBody>
+              <a:bodyPr wrap="square" rtlCol="0">
+                <a:spAutoFit/>
+              </a:bodyPr>
+              <a:lstStyle/>
+              <a:p>
+                <a:pPr algn="ctr"/>
+                <a14:m>
+                  <m:oMathPara xmlns:m="http://schemas.openxmlformats.org/officeDocument/2006/math">
+                    <m:oMathParaPr>
+                      <m:jc m:val="center"/>
+                    </m:oMathParaPr>
+                    <m:oMath xmlns:m="http://schemas.openxmlformats.org/officeDocument/2006/math">
+                      <m:sSub>
+                        <m:sSubPr>
+                          <m:ctrlPr>
+                            <a:rPr lang="el-GR" i="1" smtClean="0">
+                              <a:latin typeface="Cambria Math" panose="02040503050406030204" pitchFamily="18" charset="0"/>
+                            </a:rPr>
+                          </m:ctrlPr>
+                        </m:sSubPr>
+                        <m:e>
+                          <m:r>
+                            <m:rPr>
+                              <m:sty m:val="p"/>
+                            </m:rPr>
+                            <a:rPr lang="el-GR" i="1">
+                              <a:latin typeface="Cambria Math" panose="02040503050406030204" pitchFamily="18" charset="0"/>
+                            </a:rPr>
+                            <m:t>Γ</m:t>
+                          </m:r>
+                        </m:e>
+                        <m:sub>
+                          <m:r>
+                            <m:rPr>
+                              <m:sty m:val="p"/>
+                            </m:rPr>
+                            <a:rPr lang="it-IT" b="0" i="0" smtClean="0">
+                              <a:latin typeface="Cambria Math" panose="02040503050406030204" pitchFamily="18" charset="0"/>
+                            </a:rPr>
+                            <m:t>out</m:t>
+                          </m:r>
+                        </m:sub>
+                      </m:sSub>
+                    </m:oMath>
+                  </m:oMathPara>
+                </a14:m>
+                <a:endParaRPr lang="it-IT" sz="1400" i="1" dirty="0"/>
+              </a:p>
+            </p:txBody>
+          </p:sp>
+        </mc:Choice>
+        <mc:Fallback>
+          <p:sp>
+            <p:nvSpPr>
+              <p:cNvPr id="18" name="CasellaDiTesto 17">
+                <a:extLst>
+                  <a:ext uri="{FF2B5EF4-FFF2-40B4-BE49-F238E27FC236}">
+                    <a16:creationId xmlns:a16="http://schemas.microsoft.com/office/drawing/2014/main" id="{12C1ED30-8A01-4170-ACC0-408D041CAF54}"/>
+                  </a:ext>
+                </a:extLst>
+              </p:cNvPr>
+              <p:cNvSpPr txBox="1">
+                <a:spLocks noRot="1" noChangeAspect="1" noMove="1" noResize="1" noEditPoints="1" noAdjustHandles="1" noChangeArrowheads="1" noChangeShapeType="1" noTextEdit="1"/>
+              </p:cNvSpPr>
+              <p:nvPr/>
+            </p:nvSpPr>
+            <p:spPr>
+              <a:xfrm>
+                <a:off x="7825797" y="809803"/>
+                <a:ext cx="540000" cy="369332"/>
+              </a:xfrm>
+              <a:prstGeom prst="rect">
+                <a:avLst/>
+              </a:prstGeom>
+              <a:blipFill>
+                <a:blip r:embed="rId2"/>
+                <a:stretch>
+                  <a:fillRect l="-5682"/>
+                </a:stretch>
+              </a:blipFill>
+            </p:spPr>
+            <p:txBody>
+              <a:bodyPr/>
+              <a:lstStyle/>
+              <a:p>
+                <a:r>
+                  <a:rPr lang="it-IT">
+                    <a:noFill/>
+                  </a:rPr>
+                  <a:t> </a:t>
+                </a:r>
+              </a:p>
+            </p:txBody>
+          </p:sp>
+        </mc:Fallback>
+      </mc:AlternateContent>
+      <mc:AlternateContent xmlns:mc="http://schemas.openxmlformats.org/markup-compatibility/2006" xmlns:a14="http://schemas.microsoft.com/office/drawing/2010/main">
+        <mc:Choice Requires="a14">
+          <p:sp>
+            <p:nvSpPr>
+              <p:cNvPr id="19" name="CasellaDiTesto 18">
+                <a:extLst>
+                  <a:ext uri="{FF2B5EF4-FFF2-40B4-BE49-F238E27FC236}">
+                    <a16:creationId xmlns:a16="http://schemas.microsoft.com/office/drawing/2014/main" id="{EBE6686A-2FB0-43AC-B4D9-642B05AF4DF9}"/>
+                  </a:ext>
+                </a:extLst>
+              </p:cNvPr>
+              <p:cNvSpPr txBox="1"/>
+              <p:nvPr/>
+            </p:nvSpPr>
+            <p:spPr>
+              <a:xfrm>
+                <a:off x="289404" y="784403"/>
+                <a:ext cx="540000" cy="369332"/>
+              </a:xfrm>
+              <a:prstGeom prst="rect">
+                <a:avLst/>
+              </a:prstGeom>
+              <a:noFill/>
+            </p:spPr>
+            <p:txBody>
+              <a:bodyPr wrap="square" rtlCol="0">
+                <a:spAutoFit/>
+              </a:bodyPr>
+              <a:lstStyle/>
+              <a:p>
+                <a:pPr algn="ctr"/>
+                <a14:m>
+                  <m:oMathPara xmlns:m="http://schemas.openxmlformats.org/officeDocument/2006/math">
+                    <m:oMathParaPr>
+                      <m:jc m:val="center"/>
+                    </m:oMathParaPr>
+                    <m:oMath xmlns:m="http://schemas.openxmlformats.org/officeDocument/2006/math">
+                      <m:sSub>
+                        <m:sSubPr>
+                          <m:ctrlPr>
+                            <a:rPr lang="el-GR" i="1" smtClean="0">
+                              <a:latin typeface="Cambria Math" panose="02040503050406030204" pitchFamily="18" charset="0"/>
+                            </a:rPr>
+                          </m:ctrlPr>
+                        </m:sSubPr>
+                        <m:e>
+                          <m:r>
+                            <m:rPr>
+                              <m:sty m:val="p"/>
+                            </m:rPr>
+                            <a:rPr lang="el-GR" i="1">
+                              <a:latin typeface="Cambria Math" panose="02040503050406030204" pitchFamily="18" charset="0"/>
+                            </a:rPr>
+                            <m:t>Γ</m:t>
+                          </m:r>
+                        </m:e>
+                        <m:sub>
+                          <m:r>
+                            <m:rPr>
+                              <m:sty m:val="p"/>
+                            </m:rPr>
+                            <a:rPr lang="it-IT" b="0" i="0" smtClean="0">
+                              <a:latin typeface="Cambria Math" panose="02040503050406030204" pitchFamily="18" charset="0"/>
+                            </a:rPr>
+                            <m:t>in</m:t>
+                          </m:r>
+                        </m:sub>
+                      </m:sSub>
+                    </m:oMath>
+                  </m:oMathPara>
+                </a14:m>
+                <a:endParaRPr lang="it-IT" sz="1400" i="1" dirty="0"/>
+              </a:p>
+            </p:txBody>
+          </p:sp>
+        </mc:Choice>
+        <mc:Fallback xmlns="">
+          <p:sp>
+            <p:nvSpPr>
+              <p:cNvPr id="19" name="CasellaDiTesto 18">
+                <a:extLst>
+                  <a:ext uri="{FF2B5EF4-FFF2-40B4-BE49-F238E27FC236}">
+                    <a16:creationId xmlns:a16="http://schemas.microsoft.com/office/drawing/2014/main" id="{EBE6686A-2FB0-43AC-B4D9-642B05AF4DF9}"/>
+                  </a:ext>
+                </a:extLst>
+              </p:cNvPr>
+              <p:cNvSpPr txBox="1">
+                <a:spLocks noRot="1" noChangeAspect="1" noMove="1" noResize="1" noEditPoints="1" noAdjustHandles="1" noChangeArrowheads="1" noChangeShapeType="1" noTextEdit="1"/>
+              </p:cNvSpPr>
+              <p:nvPr/>
+            </p:nvSpPr>
+            <p:spPr>
+              <a:xfrm>
+                <a:off x="289404" y="784403"/>
+                <a:ext cx="540000" cy="369332"/>
+              </a:xfrm>
+              <a:prstGeom prst="rect">
+                <a:avLst/>
+              </a:prstGeom>
+              <a:blipFill>
+                <a:blip r:embed="rId3"/>
+                <a:stretch>
+                  <a:fillRect b="-1667"/>
+                </a:stretch>
+              </a:blipFill>
+            </p:spPr>
+            <p:txBody>
+              <a:bodyPr/>
+              <a:lstStyle/>
+              <a:p>
+                <a:r>
+                  <a:rPr lang="it-IT">
+                    <a:noFill/>
+                  </a:rPr>
+                  <a:t> </a:t>
+                </a:r>
+              </a:p>
+            </p:txBody>
+          </p:sp>
+        </mc:Fallback>
+      </mc:AlternateContent>
+      <mc:AlternateContent xmlns:mc="http://schemas.openxmlformats.org/markup-compatibility/2006">
+        <mc:Choice xmlns:a14="http://schemas.microsoft.com/office/drawing/2010/main" Requires="a14">
+          <p:sp>
+            <p:nvSpPr>
+              <p:cNvPr id="20" name="CasellaDiTesto 19">
+                <a:extLst>
+                  <a:ext uri="{FF2B5EF4-FFF2-40B4-BE49-F238E27FC236}">
+                    <a16:creationId xmlns:a16="http://schemas.microsoft.com/office/drawing/2014/main" id="{A0F0FB08-051F-4C68-9860-C0CE1AE286CB}"/>
+                  </a:ext>
+                </a:extLst>
+              </p:cNvPr>
+              <p:cNvSpPr txBox="1"/>
+              <p:nvPr/>
+            </p:nvSpPr>
+            <p:spPr>
+              <a:xfrm>
+                <a:off x="3713228" y="0"/>
+                <a:ext cx="540000" cy="391261"/>
+              </a:xfrm>
+              <a:prstGeom prst="rect">
+                <a:avLst/>
+              </a:prstGeom>
+              <a:noFill/>
+            </p:spPr>
+            <p:txBody>
+              <a:bodyPr wrap="square" rtlCol="0">
+                <a:spAutoFit/>
+              </a:bodyPr>
+              <a:lstStyle/>
+              <a:p>
+                <a:pPr algn="ctr"/>
+                <a14:m>
+                  <m:oMathPara xmlns:m="http://schemas.openxmlformats.org/officeDocument/2006/math">
+                    <m:oMathParaPr>
+                      <m:jc m:val="center"/>
+                    </m:oMathParaPr>
+                    <m:oMath xmlns:m="http://schemas.openxmlformats.org/officeDocument/2006/math">
+                      <m:sSub>
+                        <m:sSubPr>
+                          <m:ctrlPr>
+                            <a:rPr lang="el-GR" i="1" smtClean="0">
+                              <a:latin typeface="Cambria Math" panose="02040503050406030204" pitchFamily="18" charset="0"/>
+                            </a:rPr>
+                          </m:ctrlPr>
+                        </m:sSubPr>
+                        <m:e>
+                          <m:r>
+                            <m:rPr>
+                              <m:sty m:val="p"/>
+                            </m:rPr>
+                            <a:rPr lang="el-GR" i="1">
+                              <a:latin typeface="Cambria Math" panose="02040503050406030204" pitchFamily="18" charset="0"/>
+                            </a:rPr>
+                            <m:t>Γ</m:t>
+                          </m:r>
+                        </m:e>
+                        <m:sub>
+                          <m:r>
+                            <m:rPr>
+                              <m:sty m:val="p"/>
+                            </m:rPr>
+                            <a:rPr lang="it-IT" b="0" i="0" smtClean="0">
+                              <a:latin typeface="Cambria Math" panose="02040503050406030204" pitchFamily="18" charset="0"/>
+                            </a:rPr>
+                            <m:t>sym</m:t>
+                          </m:r>
+                        </m:sub>
+                      </m:sSub>
+                    </m:oMath>
+                  </m:oMathPara>
+                </a14:m>
+                <a:endParaRPr lang="it-IT" sz="1400" i="1" dirty="0"/>
+              </a:p>
+            </p:txBody>
+          </p:sp>
+        </mc:Choice>
+        <mc:Fallback>
+          <p:sp>
+            <p:nvSpPr>
+              <p:cNvPr id="20" name="CasellaDiTesto 19">
+                <a:extLst>
+                  <a:ext uri="{FF2B5EF4-FFF2-40B4-BE49-F238E27FC236}">
+                    <a16:creationId xmlns:a16="http://schemas.microsoft.com/office/drawing/2014/main" id="{A0F0FB08-051F-4C68-9860-C0CE1AE286CB}"/>
+                  </a:ext>
+                </a:extLst>
+              </p:cNvPr>
+              <p:cNvSpPr txBox="1">
+                <a:spLocks noRot="1" noChangeAspect="1" noMove="1" noResize="1" noEditPoints="1" noAdjustHandles="1" noChangeArrowheads="1" noChangeShapeType="1" noTextEdit="1"/>
+              </p:cNvSpPr>
+              <p:nvPr/>
+            </p:nvSpPr>
+            <p:spPr>
+              <a:xfrm>
+                <a:off x="3713228" y="0"/>
+                <a:ext cx="540000" cy="391261"/>
+              </a:xfrm>
+              <a:prstGeom prst="rect">
+                <a:avLst/>
+              </a:prstGeom>
+              <a:blipFill>
+                <a:blip r:embed="rId4"/>
+                <a:stretch>
+                  <a:fillRect l="-10112" b="-6250"/>
+                </a:stretch>
+              </a:blipFill>
+            </p:spPr>
+            <p:txBody>
+              <a:bodyPr/>
+              <a:lstStyle/>
+              <a:p>
+                <a:r>
+                  <a:rPr lang="it-IT">
+                    <a:noFill/>
+                  </a:rPr>
+                  <a:t> </a:t>
+                </a:r>
+              </a:p>
+            </p:txBody>
+          </p:sp>
+        </mc:Fallback>
+      </mc:AlternateContent>
+      <mc:AlternateContent xmlns:mc="http://schemas.openxmlformats.org/markup-compatibility/2006">
+        <mc:Choice xmlns:a14="http://schemas.microsoft.com/office/drawing/2010/main" Requires="a14">
+          <p:sp>
+            <p:nvSpPr>
+              <p:cNvPr id="21" name="CasellaDiTesto 20">
+                <a:extLst>
+                  <a:ext uri="{FF2B5EF4-FFF2-40B4-BE49-F238E27FC236}">
+                    <a16:creationId xmlns:a16="http://schemas.microsoft.com/office/drawing/2014/main" id="{0047343E-80C8-417A-BDFE-4E5213855482}"/>
+                  </a:ext>
+                </a:extLst>
+              </p:cNvPr>
+              <p:cNvSpPr txBox="1"/>
+              <p:nvPr/>
+            </p:nvSpPr>
+            <p:spPr>
+              <a:xfrm>
+                <a:off x="3647481" y="900260"/>
+                <a:ext cx="540000" cy="369332"/>
+              </a:xfrm>
+              <a:prstGeom prst="rect">
+                <a:avLst/>
+              </a:prstGeom>
+              <a:noFill/>
+            </p:spPr>
+            <p:txBody>
+              <a:bodyPr wrap="square" rtlCol="0">
+                <a:spAutoFit/>
+              </a:bodyPr>
+              <a:lstStyle/>
+              <a:p>
+                <a:pPr algn="ctr"/>
+                <a14:m>
+                  <m:oMathPara xmlns:m="http://schemas.openxmlformats.org/officeDocument/2006/math">
+                    <m:oMathParaPr>
+                      <m:jc m:val="center"/>
+                    </m:oMathParaPr>
+                    <m:oMath xmlns:m="http://schemas.openxmlformats.org/officeDocument/2006/math">
+                      <m:sSub>
+                        <m:sSubPr>
+                          <m:ctrlPr>
+                            <a:rPr lang="el-GR" i="1" smtClean="0">
+                              <a:latin typeface="Cambria Math" panose="02040503050406030204" pitchFamily="18" charset="0"/>
+                            </a:rPr>
+                          </m:ctrlPr>
+                        </m:sSubPr>
+                        <m:e>
+                          <m:r>
+                            <m:rPr>
+                              <m:sty m:val="p"/>
+                            </m:rPr>
+                            <a:rPr lang="el-GR" i="1">
+                              <a:latin typeface="Cambria Math" panose="02040503050406030204" pitchFamily="18" charset="0"/>
+                            </a:rPr>
+                            <m:t>Γ</m:t>
+                          </m:r>
+                        </m:e>
+                        <m:sub>
+                          <m:r>
+                            <a:rPr lang="it-IT" b="0" i="1" smtClean="0">
+                              <a:latin typeface="Cambria Math" panose="02040503050406030204" pitchFamily="18" charset="0"/>
+                            </a:rPr>
+                            <m:t>𝑤</m:t>
+                          </m:r>
+                        </m:sub>
+                      </m:sSub>
+                    </m:oMath>
+                  </m:oMathPara>
+                </a14:m>
+                <a:endParaRPr lang="it-IT" sz="1400" i="1" dirty="0"/>
+              </a:p>
+            </p:txBody>
+          </p:sp>
+        </mc:Choice>
+        <mc:Fallback>
+          <p:sp>
+            <p:nvSpPr>
+              <p:cNvPr id="21" name="CasellaDiTesto 20">
+                <a:extLst>
+                  <a:ext uri="{FF2B5EF4-FFF2-40B4-BE49-F238E27FC236}">
+                    <a16:creationId xmlns:a16="http://schemas.microsoft.com/office/drawing/2014/main" id="{0047343E-80C8-417A-BDFE-4E5213855482}"/>
+                  </a:ext>
+                </a:extLst>
+              </p:cNvPr>
+              <p:cNvSpPr txBox="1">
+                <a:spLocks noRot="1" noChangeAspect="1" noMove="1" noResize="1" noEditPoints="1" noAdjustHandles="1" noChangeArrowheads="1" noChangeShapeType="1" noTextEdit="1"/>
+              </p:cNvSpPr>
+              <p:nvPr/>
+            </p:nvSpPr>
+            <p:spPr>
+              <a:xfrm>
+                <a:off x="3647481" y="900260"/>
+                <a:ext cx="540000" cy="369332"/>
+              </a:xfrm>
+              <a:prstGeom prst="rect">
+                <a:avLst/>
+              </a:prstGeom>
+              <a:blipFill>
+                <a:blip r:embed="rId5"/>
+                <a:stretch>
+                  <a:fillRect/>
+                </a:stretch>
+              </a:blipFill>
+            </p:spPr>
+            <p:txBody>
+              <a:bodyPr/>
+              <a:lstStyle/>
+              <a:p>
+                <a:r>
+                  <a:rPr lang="it-IT">
+                    <a:noFill/>
+                  </a:rPr>
+                  <a:t> </a:t>
+                </a:r>
+              </a:p>
+            </p:txBody>
+          </p:sp>
+        </mc:Fallback>
+      </mc:AlternateContent>
+      <p:sp>
+        <p:nvSpPr>
+          <p:cNvPr id="22" name="CasellaDiTesto 21">
+            <a:extLst>
+              <a:ext uri="{FF2B5EF4-FFF2-40B4-BE49-F238E27FC236}">
+                <a16:creationId xmlns:a16="http://schemas.microsoft.com/office/drawing/2014/main" id="{87FD51C1-C924-47C9-A646-5ECCF91E6D61}"/>
+              </a:ext>
+            </a:extLst>
+          </p:cNvPr>
+          <p:cNvSpPr txBox="1"/>
+          <p:nvPr/>
+        </p:nvSpPr>
+        <p:spPr>
+          <a:xfrm>
+            <a:off x="2761800" y="464876"/>
+            <a:ext cx="720000" cy="338554"/>
+          </a:xfrm>
+          <a:prstGeom prst="rect">
+            <a:avLst/>
+          </a:prstGeom>
+          <a:noFill/>
+        </p:spPr>
+        <p:txBody>
+          <a:bodyPr wrap="square" rtlCol="0">
+            <a:spAutoFit/>
+          </a:bodyPr>
+          <a:lstStyle/>
+          <a:p>
+            <a:pPr algn="ctr"/>
+            <a:r>
+              <a:rPr lang="it-IT" sz="1600" dirty="0"/>
+              <a:t>4 m</a:t>
+            </a:r>
+          </a:p>
+        </p:txBody>
+      </p:sp>
+      <p:sp>
+        <p:nvSpPr>
+          <p:cNvPr id="23" name="CasellaDiTesto 22">
+            <a:extLst>
+              <a:ext uri="{FF2B5EF4-FFF2-40B4-BE49-F238E27FC236}">
+                <a16:creationId xmlns:a16="http://schemas.microsoft.com/office/drawing/2014/main" id="{6114D81E-EB67-47F9-8ABE-0C2C637D9E58}"/>
+              </a:ext>
+            </a:extLst>
+          </p:cNvPr>
+          <p:cNvSpPr txBox="1"/>
+          <p:nvPr/>
+        </p:nvSpPr>
+        <p:spPr>
+          <a:xfrm>
+            <a:off x="7201476" y="464145"/>
+            <a:ext cx="720000" cy="338554"/>
+          </a:xfrm>
+          <a:prstGeom prst="rect">
+            <a:avLst/>
+          </a:prstGeom>
+          <a:noFill/>
+        </p:spPr>
+        <p:txBody>
+          <a:bodyPr wrap="square" rtlCol="0">
+            <a:spAutoFit/>
+          </a:bodyPr>
+          <a:lstStyle/>
+          <a:p>
+            <a:pPr algn="ctr"/>
+            <a:r>
+              <a:rPr lang="it-IT" sz="1600" dirty="0"/>
+              <a:t>1 m</a:t>
+            </a:r>
+          </a:p>
+        </p:txBody>
+      </p:sp>
+      <p:sp>
+        <p:nvSpPr>
+          <p:cNvPr id="24" name="CasellaDiTesto 23">
+            <a:extLst>
+              <a:ext uri="{FF2B5EF4-FFF2-40B4-BE49-F238E27FC236}">
+                <a16:creationId xmlns:a16="http://schemas.microsoft.com/office/drawing/2014/main" id="{286A9E45-DC3B-410F-8644-78B01C8C5BE3}"/>
+              </a:ext>
+            </a:extLst>
+          </p:cNvPr>
+          <p:cNvSpPr txBox="1"/>
+          <p:nvPr/>
+        </p:nvSpPr>
+        <p:spPr>
+          <a:xfrm>
+            <a:off x="1390362" y="784269"/>
+            <a:ext cx="654247" cy="338554"/>
+          </a:xfrm>
+          <a:prstGeom prst="rect">
+            <a:avLst/>
+          </a:prstGeom>
+          <a:noFill/>
+        </p:spPr>
+        <p:txBody>
+          <a:bodyPr wrap="square" rtlCol="0">
+            <a:spAutoFit/>
+          </a:bodyPr>
+          <a:lstStyle/>
+          <a:p>
+            <a:pPr algn="ctr"/>
+            <a:r>
+              <a:rPr lang="it-IT" sz="1600" dirty="0"/>
+              <a:t>0.6 m</a:t>
+            </a:r>
+          </a:p>
+        </p:txBody>
+      </p:sp>
+      <p:sp>
+        <p:nvSpPr>
+          <p:cNvPr id="25" name="CasellaDiTesto 24">
+            <a:extLst>
+              <a:ext uri="{FF2B5EF4-FFF2-40B4-BE49-F238E27FC236}">
+                <a16:creationId xmlns:a16="http://schemas.microsoft.com/office/drawing/2014/main" id="{02F7C37E-7914-4D53-A41E-EF9DE6131105}"/>
+              </a:ext>
+            </a:extLst>
+          </p:cNvPr>
+          <p:cNvSpPr txBox="1"/>
+          <p:nvPr/>
+        </p:nvSpPr>
+        <p:spPr>
+          <a:xfrm>
+            <a:off x="5113876" y="961200"/>
+            <a:ext cx="1063437" cy="338554"/>
+          </a:xfrm>
+          <a:prstGeom prst="rect">
+            <a:avLst/>
+          </a:prstGeom>
+          <a:noFill/>
+        </p:spPr>
+        <p:txBody>
+          <a:bodyPr wrap="square" rtlCol="0">
+            <a:spAutoFit/>
+          </a:bodyPr>
+          <a:lstStyle/>
+          <a:p>
+            <a:pPr algn="ctr"/>
+            <a:r>
+              <a:rPr lang="it-IT" sz="1600" i="1" dirty="0"/>
+              <a:t>h</a:t>
+            </a:r>
+            <a:r>
+              <a:rPr lang="it-IT" sz="1600" dirty="0"/>
+              <a:t> = 0.1 m</a:t>
+            </a:r>
+          </a:p>
+        </p:txBody>
+      </p:sp>
+      <p:cxnSp>
+        <p:nvCxnSpPr>
+          <p:cNvPr id="28" name="Connettore diritto 27">
+            <a:extLst>
+              <a:ext uri="{FF2B5EF4-FFF2-40B4-BE49-F238E27FC236}">
+                <a16:creationId xmlns:a16="http://schemas.microsoft.com/office/drawing/2014/main" id="{55E41AE5-48A5-4C34-915E-04692A0CB9AD}"/>
+              </a:ext>
+            </a:extLst>
+          </p:cNvPr>
+          <p:cNvCxnSpPr/>
+          <p:nvPr/>
+        </p:nvCxnSpPr>
+        <p:spPr>
+          <a:xfrm>
+            <a:off x="6120000" y="1080000"/>
+            <a:ext cx="0" cy="144000"/>
+          </a:xfrm>
+          <a:prstGeom prst="line">
+            <a:avLst/>
+          </a:prstGeom>
+          <a:ln w="12700" cap="sq">
+            <a:solidFill>
+              <a:srgbClr val="FF0000"/>
+            </a:solidFill>
+          </a:ln>
+        </p:spPr>
+        <p:style>
+          <a:lnRef idx="1">
+            <a:schemeClr val="accent1"/>
+          </a:lnRef>
+          <a:fillRef idx="0">
+            <a:schemeClr val="accent1"/>
+          </a:fillRef>
+          <a:effectRef idx="0">
+            <a:schemeClr val="accent1"/>
+          </a:effectRef>
+          <a:fontRef idx="minor">
+            <a:schemeClr val="tx1"/>
+          </a:fontRef>
+        </p:style>
+      </p:cxnSp>
+      <p:cxnSp>
+        <p:nvCxnSpPr>
+          <p:cNvPr id="29" name="Connettore diritto 28">
+            <a:extLst>
+              <a:ext uri="{FF2B5EF4-FFF2-40B4-BE49-F238E27FC236}">
+                <a16:creationId xmlns:a16="http://schemas.microsoft.com/office/drawing/2014/main" id="{B2C35225-5DE9-4955-A47F-01AE0002E245}"/>
+              </a:ext>
+            </a:extLst>
+          </p:cNvPr>
+          <p:cNvCxnSpPr/>
+          <p:nvPr/>
+        </p:nvCxnSpPr>
+        <p:spPr>
+          <a:xfrm>
+            <a:off x="6840000" y="1224000"/>
+            <a:ext cx="1440000" cy="0"/>
+          </a:xfrm>
+          <a:prstGeom prst="line">
+            <a:avLst/>
+          </a:prstGeom>
+          <a:ln w="12700" cap="sq"/>
+        </p:spPr>
+        <p:style>
+          <a:lnRef idx="1">
+            <a:schemeClr val="dk1"/>
+          </a:lnRef>
+          <a:fillRef idx="0">
+            <a:schemeClr val="dk1"/>
+          </a:fillRef>
+          <a:effectRef idx="0">
+            <a:schemeClr val="dk1"/>
+          </a:effectRef>
+          <a:fontRef idx="minor">
+            <a:schemeClr val="tx1"/>
+          </a:fontRef>
+        </p:style>
+      </p:cxnSp>
+      <p:cxnSp>
+        <p:nvCxnSpPr>
+          <p:cNvPr id="30" name="Connettore diritto 29">
+            <a:extLst>
+              <a:ext uri="{FF2B5EF4-FFF2-40B4-BE49-F238E27FC236}">
+                <a16:creationId xmlns:a16="http://schemas.microsoft.com/office/drawing/2014/main" id="{BECEF64C-9884-43CE-9CFC-A993FF79C000}"/>
+              </a:ext>
+            </a:extLst>
+          </p:cNvPr>
+          <p:cNvCxnSpPr/>
+          <p:nvPr/>
+        </p:nvCxnSpPr>
+        <p:spPr>
+          <a:xfrm>
+            <a:off x="6120000" y="1080000"/>
+            <a:ext cx="720000" cy="0"/>
+          </a:xfrm>
+          <a:prstGeom prst="line">
+            <a:avLst/>
+          </a:prstGeom>
+          <a:ln w="12700" cap="sq">
+            <a:solidFill>
+              <a:srgbClr val="FF0000"/>
+            </a:solidFill>
+          </a:ln>
+        </p:spPr>
+        <p:style>
+          <a:lnRef idx="1">
+            <a:schemeClr val="dk1"/>
+          </a:lnRef>
+          <a:fillRef idx="0">
+            <a:schemeClr val="dk1"/>
+          </a:fillRef>
+          <a:effectRef idx="0">
+            <a:schemeClr val="dk1"/>
+          </a:effectRef>
+          <a:fontRef idx="minor">
+            <a:schemeClr val="tx1"/>
+          </a:fontRef>
+        </p:style>
+      </p:cxnSp>
+      <p:cxnSp>
+        <p:nvCxnSpPr>
+          <p:cNvPr id="32" name="Connettore 2 31">
+            <a:extLst>
+              <a:ext uri="{FF2B5EF4-FFF2-40B4-BE49-F238E27FC236}">
+                <a16:creationId xmlns:a16="http://schemas.microsoft.com/office/drawing/2014/main" id="{423C7A5D-B3EB-4A17-83F7-31FC68781814}"/>
+              </a:ext>
+            </a:extLst>
+          </p:cNvPr>
+          <p:cNvCxnSpPr/>
+          <p:nvPr/>
+        </p:nvCxnSpPr>
+        <p:spPr>
+          <a:xfrm>
+            <a:off x="6120000" y="720000"/>
+            <a:ext cx="720000" cy="0"/>
+          </a:xfrm>
+          <a:prstGeom prst="straightConnector1">
+            <a:avLst/>
+          </a:prstGeom>
+          <a:ln w="12700">
+            <a:solidFill>
+              <a:schemeClr val="tx1"/>
+            </a:solidFill>
+            <a:headEnd type="triangle"/>
+            <a:tailEnd type="triangle"/>
+          </a:ln>
+        </p:spPr>
+        <p:style>
+          <a:lnRef idx="1">
+            <a:schemeClr val="accent1"/>
+          </a:lnRef>
+          <a:fillRef idx="0">
+            <a:schemeClr val="accent1"/>
+          </a:fillRef>
+          <a:effectRef idx="0">
+            <a:schemeClr val="accent1"/>
+          </a:effectRef>
+          <a:fontRef idx="minor">
+            <a:schemeClr val="tx1"/>
+          </a:fontRef>
+        </p:style>
+      </p:cxnSp>
+      <p:cxnSp>
+        <p:nvCxnSpPr>
+          <p:cNvPr id="36" name="Connettore 2 35">
+            <a:extLst>
+              <a:ext uri="{FF2B5EF4-FFF2-40B4-BE49-F238E27FC236}">
+                <a16:creationId xmlns:a16="http://schemas.microsoft.com/office/drawing/2014/main" id="{A5769590-61B1-47C0-8EB8-2F3512A008E9}"/>
+              </a:ext>
+            </a:extLst>
+          </p:cNvPr>
+          <p:cNvCxnSpPr/>
+          <p:nvPr/>
+        </p:nvCxnSpPr>
+        <p:spPr>
+          <a:xfrm>
+            <a:off x="6840000" y="720000"/>
+            <a:ext cx="1440000" cy="0"/>
+          </a:xfrm>
+          <a:prstGeom prst="straightConnector1">
+            <a:avLst/>
+          </a:prstGeom>
+          <a:ln w="12700">
+            <a:solidFill>
+              <a:schemeClr val="tx1"/>
+            </a:solidFill>
+            <a:headEnd type="triangle"/>
+            <a:tailEnd type="triangle"/>
+          </a:ln>
+        </p:spPr>
+        <p:style>
+          <a:lnRef idx="1">
+            <a:schemeClr val="accent1"/>
+          </a:lnRef>
+          <a:fillRef idx="0">
+            <a:schemeClr val="accent1"/>
+          </a:fillRef>
+          <a:effectRef idx="0">
+            <a:schemeClr val="accent1"/>
+          </a:effectRef>
+          <a:fontRef idx="minor">
+            <a:schemeClr val="tx1"/>
+          </a:fontRef>
+        </p:style>
+      </p:cxnSp>
+      <p:cxnSp>
+        <p:nvCxnSpPr>
+          <p:cNvPr id="39" name="Connettore 2 38">
+            <a:extLst>
+              <a:ext uri="{FF2B5EF4-FFF2-40B4-BE49-F238E27FC236}">
+                <a16:creationId xmlns:a16="http://schemas.microsoft.com/office/drawing/2014/main" id="{C99A45B3-287D-426D-A557-E3600A617328}"/>
+              </a:ext>
+            </a:extLst>
+          </p:cNvPr>
+          <p:cNvCxnSpPr/>
+          <p:nvPr/>
+        </p:nvCxnSpPr>
+        <p:spPr>
+          <a:xfrm>
+            <a:off x="8460000" y="252000"/>
+            <a:ext cx="0" cy="1116000"/>
+          </a:xfrm>
+          <a:prstGeom prst="straightConnector1">
+            <a:avLst/>
+          </a:prstGeom>
+          <a:ln w="12700">
+            <a:solidFill>
+              <a:schemeClr val="tx1"/>
+            </a:solidFill>
+            <a:headEnd type="arrow"/>
+            <a:tailEnd type="none"/>
+          </a:ln>
+        </p:spPr>
+        <p:style>
+          <a:lnRef idx="1">
+            <a:schemeClr val="accent1"/>
+          </a:lnRef>
+          <a:fillRef idx="0">
+            <a:schemeClr val="accent1"/>
+          </a:fillRef>
+          <a:effectRef idx="0">
+            <a:schemeClr val="accent1"/>
+          </a:effectRef>
+          <a:fontRef idx="minor">
+            <a:schemeClr val="tx1"/>
+          </a:fontRef>
+        </p:style>
+      </p:cxnSp>
+      <p:cxnSp>
+        <p:nvCxnSpPr>
+          <p:cNvPr id="40" name="Connettore diritto 39">
+            <a:extLst>
+              <a:ext uri="{FF2B5EF4-FFF2-40B4-BE49-F238E27FC236}">
+                <a16:creationId xmlns:a16="http://schemas.microsoft.com/office/drawing/2014/main" id="{FA1E8366-5233-4A85-8CE2-A6441203982A}"/>
+              </a:ext>
+            </a:extLst>
+          </p:cNvPr>
+          <p:cNvCxnSpPr/>
+          <p:nvPr/>
+        </p:nvCxnSpPr>
+        <p:spPr>
+          <a:xfrm>
+            <a:off x="8424000" y="1224000"/>
+            <a:ext cx="72000" cy="0"/>
+          </a:xfrm>
+          <a:prstGeom prst="line">
+            <a:avLst/>
+          </a:prstGeom>
+          <a:ln w="12700" cap="sq">
+            <a:solidFill>
+              <a:schemeClr val="tx1"/>
+            </a:solidFill>
+          </a:ln>
+        </p:spPr>
+        <p:style>
+          <a:lnRef idx="1">
+            <a:schemeClr val="accent1"/>
+          </a:lnRef>
+          <a:fillRef idx="0">
+            <a:schemeClr val="accent1"/>
+          </a:fillRef>
+          <a:effectRef idx="0">
+            <a:schemeClr val="accent1"/>
+          </a:effectRef>
+          <a:fontRef idx="minor">
+            <a:schemeClr val="tx1"/>
+          </a:fontRef>
+        </p:style>
+      </p:cxnSp>
+      <mc:AlternateContent xmlns:mc="http://schemas.openxmlformats.org/markup-compatibility/2006">
+        <mc:Choice xmlns:a14="http://schemas.microsoft.com/office/drawing/2010/main" Requires="a14">
+          <p:sp>
+            <p:nvSpPr>
+              <p:cNvPr id="41" name="CasellaDiTesto 40">
+                <a:extLst>
+                  <a:ext uri="{FF2B5EF4-FFF2-40B4-BE49-F238E27FC236}">
+                    <a16:creationId xmlns:a16="http://schemas.microsoft.com/office/drawing/2014/main" id="{F9EBAB4D-D138-4F72-AA8D-D76707904256}"/>
+                  </a:ext>
+                </a:extLst>
+              </p:cNvPr>
+              <p:cNvSpPr txBox="1"/>
+              <p:nvPr/>
+            </p:nvSpPr>
+            <p:spPr>
+              <a:xfrm>
+                <a:off x="8218800" y="-96988"/>
+                <a:ext cx="540000" cy="369332"/>
+              </a:xfrm>
+              <a:prstGeom prst="rect">
+                <a:avLst/>
+              </a:prstGeom>
+              <a:noFill/>
+            </p:spPr>
+            <p:txBody>
+              <a:bodyPr wrap="square" rtlCol="0">
+                <a:spAutoFit/>
+              </a:bodyPr>
+              <a:lstStyle/>
+              <a:p>
+                <a:pPr algn="ctr"/>
+                <a14:m>
+                  <m:oMathPara xmlns:m="http://schemas.openxmlformats.org/officeDocument/2006/math">
+                    <m:oMathParaPr>
+                      <m:jc m:val="center"/>
+                    </m:oMathParaPr>
+                    <m:oMath xmlns:m="http://schemas.openxmlformats.org/officeDocument/2006/math">
+                      <m:r>
+                        <a:rPr lang="it-IT" b="0" i="1" smtClean="0">
+                          <a:latin typeface="Cambria Math" panose="02040503050406030204" pitchFamily="18" charset="0"/>
+                        </a:rPr>
+                        <m:t>𝑦</m:t>
+                      </m:r>
+                    </m:oMath>
+                  </m:oMathPara>
+                </a14:m>
+                <a:endParaRPr lang="it-IT" sz="1400" i="1" dirty="0"/>
+              </a:p>
+            </p:txBody>
+          </p:sp>
+        </mc:Choice>
+        <mc:Fallback>
+          <p:sp>
+            <p:nvSpPr>
+              <p:cNvPr id="41" name="CasellaDiTesto 40">
+                <a:extLst>
+                  <a:ext uri="{FF2B5EF4-FFF2-40B4-BE49-F238E27FC236}">
+                    <a16:creationId xmlns:a16="http://schemas.microsoft.com/office/drawing/2014/main" id="{F9EBAB4D-D138-4F72-AA8D-D76707904256}"/>
+                  </a:ext>
+                </a:extLst>
+              </p:cNvPr>
+              <p:cNvSpPr txBox="1">
+                <a:spLocks noRot="1" noChangeAspect="1" noMove="1" noResize="1" noEditPoints="1" noAdjustHandles="1" noChangeArrowheads="1" noChangeShapeType="1" noTextEdit="1"/>
+              </p:cNvSpPr>
+              <p:nvPr/>
+            </p:nvSpPr>
+            <p:spPr>
+              <a:xfrm>
+                <a:off x="8218800" y="-96988"/>
+                <a:ext cx="540000" cy="369332"/>
+              </a:xfrm>
+              <a:prstGeom prst="rect">
+                <a:avLst/>
+              </a:prstGeom>
+              <a:blipFill>
+                <a:blip r:embed="rId6"/>
+                <a:stretch>
+                  <a:fillRect b="-6557"/>
+                </a:stretch>
+              </a:blipFill>
+            </p:spPr>
+            <p:txBody>
+              <a:bodyPr/>
+              <a:lstStyle/>
+              <a:p>
+                <a:r>
+                  <a:rPr lang="it-IT">
+                    <a:noFill/>
+                  </a:rPr>
+                  <a:t> </a:t>
+                </a:r>
+              </a:p>
+            </p:txBody>
+          </p:sp>
+        </mc:Fallback>
+      </mc:AlternateContent>
+      <mc:AlternateContent xmlns:mc="http://schemas.openxmlformats.org/markup-compatibility/2006">
+        <mc:Choice xmlns:a14="http://schemas.microsoft.com/office/drawing/2010/main" Requires="a14">
+          <p:sp>
+            <p:nvSpPr>
+              <p:cNvPr id="42" name="CasellaDiTesto 41">
+                <a:extLst>
+                  <a:ext uri="{FF2B5EF4-FFF2-40B4-BE49-F238E27FC236}">
+                    <a16:creationId xmlns:a16="http://schemas.microsoft.com/office/drawing/2014/main" id="{6297F5ED-836D-470A-9990-4A434A86F732}"/>
+                  </a:ext>
+                </a:extLst>
+              </p:cNvPr>
+              <p:cNvSpPr txBox="1"/>
+              <p:nvPr/>
+            </p:nvSpPr>
+            <p:spPr>
+              <a:xfrm>
+                <a:off x="8361764" y="1033200"/>
+                <a:ext cx="486510" cy="369332"/>
+              </a:xfrm>
+              <a:prstGeom prst="rect">
+                <a:avLst/>
+              </a:prstGeom>
+              <a:noFill/>
+            </p:spPr>
+            <p:txBody>
+              <a:bodyPr wrap="square" rtlCol="0">
+                <a:spAutoFit/>
+              </a:bodyPr>
+              <a:lstStyle/>
+              <a:p>
+                <a:pPr algn="ctr"/>
+                <a14:m>
+                  <m:oMathPara xmlns:m="http://schemas.openxmlformats.org/officeDocument/2006/math">
+                    <m:oMathParaPr>
+                      <m:jc m:val="center"/>
+                    </m:oMathParaPr>
+                    <m:oMath xmlns:m="http://schemas.openxmlformats.org/officeDocument/2006/math">
+                      <m:r>
+                        <a:rPr lang="it-IT" b="0" i="1" smtClean="0">
+                          <a:latin typeface="Cambria Math" panose="02040503050406030204" pitchFamily="18" charset="0"/>
+                        </a:rPr>
+                        <m:t>0</m:t>
+                      </m:r>
+                    </m:oMath>
+                  </m:oMathPara>
+                </a14:m>
+                <a:endParaRPr lang="it-IT" sz="1400" i="1" dirty="0"/>
+              </a:p>
+            </p:txBody>
+          </p:sp>
+        </mc:Choice>
+        <mc:Fallback>
+          <p:sp>
+            <p:nvSpPr>
+              <p:cNvPr id="42" name="CasellaDiTesto 41">
+                <a:extLst>
+                  <a:ext uri="{FF2B5EF4-FFF2-40B4-BE49-F238E27FC236}">
+                    <a16:creationId xmlns:a16="http://schemas.microsoft.com/office/drawing/2014/main" id="{6297F5ED-836D-470A-9990-4A434A86F732}"/>
+                  </a:ext>
+                </a:extLst>
+              </p:cNvPr>
+              <p:cNvSpPr txBox="1">
+                <a:spLocks noRot="1" noChangeAspect="1" noMove="1" noResize="1" noEditPoints="1" noAdjustHandles="1" noChangeArrowheads="1" noChangeShapeType="1" noTextEdit="1"/>
+              </p:cNvSpPr>
+              <p:nvPr/>
+            </p:nvSpPr>
+            <p:spPr>
+              <a:xfrm>
+                <a:off x="8361764" y="1033200"/>
+                <a:ext cx="486510" cy="369332"/>
+              </a:xfrm>
+              <a:prstGeom prst="rect">
+                <a:avLst/>
+              </a:prstGeom>
+              <a:blipFill>
+                <a:blip r:embed="rId7"/>
+                <a:stretch>
+                  <a:fillRect/>
+                </a:stretch>
+              </a:blipFill>
+            </p:spPr>
+            <p:txBody>
+              <a:bodyPr/>
+              <a:lstStyle/>
+              <a:p>
+                <a:r>
+                  <a:rPr lang="it-IT">
+                    <a:noFill/>
+                  </a:rPr>
+                  <a:t> </a:t>
+                </a:r>
+              </a:p>
+            </p:txBody>
+          </p:sp>
+        </mc:Fallback>
+      </mc:AlternateContent>
+      <mc:AlternateContent xmlns:mc="http://schemas.openxmlformats.org/markup-compatibility/2006" xmlns:a14="http://schemas.microsoft.com/office/drawing/2010/main">
+        <mc:Choice Requires="a14">
+          <p:sp>
+            <p:nvSpPr>
+              <p:cNvPr id="38" name="CasellaDiTesto 37">
+                <a:extLst>
+                  <a:ext uri="{FF2B5EF4-FFF2-40B4-BE49-F238E27FC236}">
+                    <a16:creationId xmlns:a16="http://schemas.microsoft.com/office/drawing/2014/main" id="{33B5B7FF-FFEF-4959-B95E-D77C2412BB70}"/>
+                  </a:ext>
+                </a:extLst>
+              </p:cNvPr>
+              <p:cNvSpPr txBox="1"/>
+              <p:nvPr/>
+            </p:nvSpPr>
+            <p:spPr>
+              <a:xfrm>
+                <a:off x="143629" y="1416989"/>
+                <a:ext cx="486510" cy="369332"/>
+              </a:xfrm>
+              <a:prstGeom prst="rect">
+                <a:avLst/>
+              </a:prstGeom>
+              <a:noFill/>
+            </p:spPr>
+            <p:txBody>
+              <a:bodyPr wrap="square" rtlCol="0">
+                <a:spAutoFit/>
+              </a:bodyPr>
+              <a:lstStyle/>
+              <a:p>
+                <a:pPr algn="ctr"/>
+                <a14:m>
+                  <m:oMathPara xmlns:m="http://schemas.openxmlformats.org/officeDocument/2006/math">
+                    <m:oMathParaPr>
+                      <m:jc m:val="center"/>
+                    </m:oMathParaPr>
+                    <m:oMath xmlns:m="http://schemas.openxmlformats.org/officeDocument/2006/math">
+                      <m:r>
+                        <a:rPr lang="it-IT" b="0" i="1" smtClean="0">
+                          <a:latin typeface="Cambria Math" panose="02040503050406030204" pitchFamily="18" charset="0"/>
+                        </a:rPr>
+                        <m:t>0</m:t>
+                      </m:r>
+                    </m:oMath>
+                  </m:oMathPara>
+                </a14:m>
+                <a:endParaRPr lang="it-IT" sz="1400" i="1" dirty="0"/>
+              </a:p>
+            </p:txBody>
+          </p:sp>
+        </mc:Choice>
+        <mc:Fallback xmlns="">
+          <p:sp>
+            <p:nvSpPr>
+              <p:cNvPr id="38" name="CasellaDiTesto 37">
+                <a:extLst>
+                  <a:ext uri="{FF2B5EF4-FFF2-40B4-BE49-F238E27FC236}">
+                    <a16:creationId xmlns:a16="http://schemas.microsoft.com/office/drawing/2014/main" id="{33B5B7FF-FFEF-4959-B95E-D77C2412BB70}"/>
+                  </a:ext>
+                </a:extLst>
+              </p:cNvPr>
+              <p:cNvSpPr txBox="1">
+                <a:spLocks noRot="1" noChangeAspect="1" noMove="1" noResize="1" noEditPoints="1" noAdjustHandles="1" noChangeArrowheads="1" noChangeShapeType="1" noTextEdit="1"/>
+              </p:cNvSpPr>
+              <p:nvPr/>
+            </p:nvSpPr>
+            <p:spPr>
+              <a:xfrm>
+                <a:off x="143629" y="1416989"/>
+                <a:ext cx="486510" cy="369332"/>
+              </a:xfrm>
+              <a:prstGeom prst="rect">
+                <a:avLst/>
+              </a:prstGeom>
+              <a:blipFill>
+                <a:blip r:embed="rId8"/>
+                <a:stretch>
+                  <a:fillRect/>
+                </a:stretch>
+              </a:blipFill>
+            </p:spPr>
+            <p:txBody>
+              <a:bodyPr/>
+              <a:lstStyle/>
+              <a:p>
+                <a:r>
+                  <a:rPr lang="it-IT">
+                    <a:noFill/>
+                  </a:rPr>
+                  <a:t> </a:t>
+                </a:r>
+              </a:p>
+            </p:txBody>
+          </p:sp>
+        </mc:Fallback>
+      </mc:AlternateContent>
+      <p:cxnSp>
+        <p:nvCxnSpPr>
+          <p:cNvPr id="43" name="Connettore 2 42">
+            <a:extLst>
+              <a:ext uri="{FF2B5EF4-FFF2-40B4-BE49-F238E27FC236}">
+                <a16:creationId xmlns:a16="http://schemas.microsoft.com/office/drawing/2014/main" id="{9E20FFC2-DA5E-461C-BBFD-D0D4397F3B78}"/>
+              </a:ext>
+            </a:extLst>
+          </p:cNvPr>
+          <p:cNvCxnSpPr/>
+          <p:nvPr/>
+        </p:nvCxnSpPr>
+        <p:spPr>
+          <a:xfrm>
+            <a:off x="252000" y="1440000"/>
+            <a:ext cx="1260000" cy="0"/>
+          </a:xfrm>
+          <a:prstGeom prst="straightConnector1">
+            <a:avLst/>
+          </a:prstGeom>
+          <a:ln w="12700">
+            <a:solidFill>
+              <a:schemeClr val="tx1"/>
+            </a:solidFill>
+            <a:headEnd type="none"/>
+            <a:tailEnd type="arrow"/>
+          </a:ln>
+        </p:spPr>
+        <p:style>
+          <a:lnRef idx="1">
+            <a:schemeClr val="accent1"/>
+          </a:lnRef>
+          <a:fillRef idx="0">
+            <a:schemeClr val="accent1"/>
+          </a:fillRef>
+          <a:effectRef idx="0">
+            <a:schemeClr val="accent1"/>
+          </a:effectRef>
+          <a:fontRef idx="minor">
+            <a:schemeClr val="tx1"/>
+          </a:fontRef>
+        </p:style>
+      </p:cxnSp>
+      <p:cxnSp>
+        <p:nvCxnSpPr>
+          <p:cNvPr id="44" name="Connettore diritto 43">
+            <a:extLst>
+              <a:ext uri="{FF2B5EF4-FFF2-40B4-BE49-F238E27FC236}">
+                <a16:creationId xmlns:a16="http://schemas.microsoft.com/office/drawing/2014/main" id="{EEB4B92D-67BC-44E3-B5F1-C3072B0FDD04}"/>
+              </a:ext>
+            </a:extLst>
+          </p:cNvPr>
+          <p:cNvCxnSpPr/>
+          <p:nvPr/>
+        </p:nvCxnSpPr>
+        <p:spPr>
+          <a:xfrm>
+            <a:off x="360000" y="1404000"/>
+            <a:ext cx="0" cy="72000"/>
+          </a:xfrm>
+          <a:prstGeom prst="line">
+            <a:avLst/>
+          </a:prstGeom>
+          <a:ln w="12700" cap="sq">
+            <a:solidFill>
+              <a:schemeClr val="tx1"/>
+            </a:solidFill>
+          </a:ln>
+        </p:spPr>
+        <p:style>
+          <a:lnRef idx="1">
+            <a:schemeClr val="accent1"/>
+          </a:lnRef>
+          <a:fillRef idx="0">
+            <a:schemeClr val="accent1"/>
+          </a:fillRef>
+          <a:effectRef idx="0">
+            <a:schemeClr val="accent1"/>
+          </a:effectRef>
+          <a:fontRef idx="minor">
+            <a:schemeClr val="tx1"/>
+          </a:fontRef>
+        </p:style>
+      </p:cxnSp>
+      <mc:AlternateContent xmlns:mc="http://schemas.openxmlformats.org/markup-compatibility/2006" xmlns:a14="http://schemas.microsoft.com/office/drawing/2010/main">
+        <mc:Choice Requires="a14">
+          <p:sp>
+            <p:nvSpPr>
+              <p:cNvPr id="45" name="CasellaDiTesto 44">
+                <a:extLst>
+                  <a:ext uri="{FF2B5EF4-FFF2-40B4-BE49-F238E27FC236}">
+                    <a16:creationId xmlns:a16="http://schemas.microsoft.com/office/drawing/2014/main" id="{B6F71516-4FDD-4D99-981C-6242CEA5595D}"/>
+                  </a:ext>
+                </a:extLst>
+              </p:cNvPr>
+              <p:cNvSpPr txBox="1"/>
+              <p:nvPr/>
+            </p:nvSpPr>
+            <p:spPr>
+              <a:xfrm>
+                <a:off x="1368000" y="1248567"/>
+                <a:ext cx="540000" cy="369332"/>
+              </a:xfrm>
+              <a:prstGeom prst="rect">
+                <a:avLst/>
+              </a:prstGeom>
+              <a:noFill/>
+            </p:spPr>
+            <p:txBody>
+              <a:bodyPr wrap="square" rtlCol="0">
+                <a:spAutoFit/>
+              </a:bodyPr>
+              <a:lstStyle/>
+              <a:p>
+                <a:pPr algn="ctr"/>
+                <a14:m>
+                  <m:oMathPara xmlns:m="http://schemas.openxmlformats.org/officeDocument/2006/math">
+                    <m:oMathParaPr>
+                      <m:jc m:val="center"/>
+                    </m:oMathParaPr>
+                    <m:oMath xmlns:m="http://schemas.openxmlformats.org/officeDocument/2006/math">
+                      <m:r>
+                        <a:rPr lang="it-IT" b="0" i="1" smtClean="0">
+                          <a:latin typeface="Cambria Math" panose="02040503050406030204" pitchFamily="18" charset="0"/>
+                        </a:rPr>
+                        <m:t>𝑥</m:t>
+                      </m:r>
+                    </m:oMath>
+                  </m:oMathPara>
+                </a14:m>
+                <a:endParaRPr lang="it-IT" sz="1400" i="1" dirty="0"/>
+              </a:p>
+            </p:txBody>
+          </p:sp>
+        </mc:Choice>
+        <mc:Fallback xmlns="">
+          <p:sp>
+            <p:nvSpPr>
+              <p:cNvPr id="45" name="CasellaDiTesto 44">
+                <a:extLst>
+                  <a:ext uri="{FF2B5EF4-FFF2-40B4-BE49-F238E27FC236}">
+                    <a16:creationId xmlns:a16="http://schemas.microsoft.com/office/drawing/2014/main" id="{B6F71516-4FDD-4D99-981C-6242CEA5595D}"/>
+                  </a:ext>
+                </a:extLst>
+              </p:cNvPr>
+              <p:cNvSpPr txBox="1">
+                <a:spLocks noRot="1" noChangeAspect="1" noMove="1" noResize="1" noEditPoints="1" noAdjustHandles="1" noChangeArrowheads="1" noChangeShapeType="1" noTextEdit="1"/>
+              </p:cNvSpPr>
+              <p:nvPr/>
+            </p:nvSpPr>
+            <p:spPr>
+              <a:xfrm>
+                <a:off x="1368000" y="1248567"/>
+                <a:ext cx="540000" cy="369332"/>
+              </a:xfrm>
+              <a:prstGeom prst="rect">
+                <a:avLst/>
+              </a:prstGeom>
+              <a:blipFill>
+                <a:blip r:embed="rId9"/>
+                <a:stretch>
+                  <a:fillRect/>
+                </a:stretch>
+              </a:blipFill>
+            </p:spPr>
+            <p:txBody>
+              <a:bodyPr/>
+              <a:lstStyle/>
+              <a:p>
+                <a:r>
+                  <a:rPr lang="it-IT">
+                    <a:noFill/>
+                  </a:rPr>
+                  <a:t> </a:t>
+                </a:r>
+              </a:p>
+            </p:txBody>
+          </p:sp>
+        </mc:Fallback>
+      </mc:AlternateContent>
+      <p:cxnSp>
+        <p:nvCxnSpPr>
+          <p:cNvPr id="46" name="Connettore diritto 45">
+            <a:extLst>
+              <a:ext uri="{FF2B5EF4-FFF2-40B4-BE49-F238E27FC236}">
+                <a16:creationId xmlns:a16="http://schemas.microsoft.com/office/drawing/2014/main" id="{8D1D970B-39B6-490F-9E83-C2D3C9221CE6}"/>
+              </a:ext>
+            </a:extLst>
+          </p:cNvPr>
+          <p:cNvCxnSpPr/>
+          <p:nvPr/>
+        </p:nvCxnSpPr>
+        <p:spPr>
+          <a:xfrm>
+            <a:off x="6120000" y="1224000"/>
+            <a:ext cx="720000" cy="0"/>
+          </a:xfrm>
+          <a:prstGeom prst="line">
+            <a:avLst/>
+          </a:prstGeom>
+          <a:ln w="12700" cap="sq">
+            <a:solidFill>
+              <a:srgbClr val="00B050"/>
+            </a:solidFill>
+          </a:ln>
+        </p:spPr>
+        <p:style>
+          <a:lnRef idx="1">
+            <a:schemeClr val="dk1"/>
+          </a:lnRef>
+          <a:fillRef idx="0">
+            <a:schemeClr val="dk1"/>
+          </a:fillRef>
+          <a:effectRef idx="0">
+            <a:schemeClr val="dk1"/>
+          </a:effectRef>
+          <a:fontRef idx="minor">
+            <a:schemeClr val="tx1"/>
+          </a:fontRef>
+        </p:style>
+      </p:cxnSp>
+      <mc:AlternateContent xmlns:mc="http://schemas.openxmlformats.org/markup-compatibility/2006">
+        <mc:Choice xmlns:a14="http://schemas.microsoft.com/office/drawing/2010/main" Requires="a14">
+          <p:sp>
+            <p:nvSpPr>
+              <p:cNvPr id="47" name="CasellaDiTesto 46">
+                <a:extLst>
+                  <a:ext uri="{FF2B5EF4-FFF2-40B4-BE49-F238E27FC236}">
+                    <a16:creationId xmlns:a16="http://schemas.microsoft.com/office/drawing/2014/main" id="{07DFA70C-DC68-425A-AC23-0E13E4DA7578}"/>
+                  </a:ext>
+                </a:extLst>
+              </p:cNvPr>
+              <p:cNvSpPr txBox="1"/>
+              <p:nvPr/>
+            </p:nvSpPr>
+            <p:spPr>
+              <a:xfrm>
+                <a:off x="6118776" y="751728"/>
+                <a:ext cx="720000" cy="369332"/>
+              </a:xfrm>
+              <a:prstGeom prst="rect">
+                <a:avLst/>
+              </a:prstGeom>
+              <a:noFill/>
+            </p:spPr>
+            <p:txBody>
+              <a:bodyPr wrap="square" rtlCol="0">
+                <a:spAutoFit/>
+              </a:bodyPr>
+              <a:lstStyle/>
+              <a:p>
+                <a:pPr algn="ctr"/>
+                <a14:m>
+                  <m:oMathPara xmlns:m="http://schemas.openxmlformats.org/officeDocument/2006/math">
+                    <m:oMathParaPr>
+                      <m:jc m:val="center"/>
+                    </m:oMathParaPr>
+                    <m:oMath xmlns:m="http://schemas.openxmlformats.org/officeDocument/2006/math">
+                      <m:sSub>
+                        <m:sSubPr>
+                          <m:ctrlPr>
+                            <a:rPr lang="el-GR" i="1" smtClean="0">
+                              <a:latin typeface="Cambria Math" panose="02040503050406030204" pitchFamily="18" charset="0"/>
+                            </a:rPr>
+                          </m:ctrlPr>
+                        </m:sSubPr>
+                        <m:e>
+                          <m:r>
+                            <m:rPr>
+                              <m:sty m:val="p"/>
+                            </m:rPr>
+                            <a:rPr lang="el-GR" i="1">
+                              <a:latin typeface="Cambria Math" panose="02040503050406030204" pitchFamily="18" charset="0"/>
+                            </a:rPr>
+                            <m:t>Γ</m:t>
+                          </m:r>
+                        </m:e>
+                        <m:sub>
+                          <m:r>
+                            <m:rPr>
+                              <m:sty m:val="p"/>
+                            </m:rPr>
+                            <a:rPr lang="it-IT" b="0" i="0" smtClean="0">
+                              <a:latin typeface="Cambria Math" panose="02040503050406030204" pitchFamily="18" charset="0"/>
+                            </a:rPr>
+                            <m:t>int</m:t>
+                          </m:r>
+                        </m:sub>
+                      </m:sSub>
+                    </m:oMath>
+                  </m:oMathPara>
+                </a14:m>
+                <a:endParaRPr lang="it-IT" sz="1600" i="1" dirty="0"/>
+              </a:p>
+            </p:txBody>
+          </p:sp>
+        </mc:Choice>
+        <mc:Fallback>
+          <p:sp>
+            <p:nvSpPr>
+              <p:cNvPr id="47" name="CasellaDiTesto 46">
+                <a:extLst>
+                  <a:ext uri="{FF2B5EF4-FFF2-40B4-BE49-F238E27FC236}">
+                    <a16:creationId xmlns:a16="http://schemas.microsoft.com/office/drawing/2014/main" id="{07DFA70C-DC68-425A-AC23-0E13E4DA7578}"/>
+                  </a:ext>
+                </a:extLst>
+              </p:cNvPr>
+              <p:cNvSpPr txBox="1">
+                <a:spLocks noRot="1" noChangeAspect="1" noMove="1" noResize="1" noEditPoints="1" noAdjustHandles="1" noChangeArrowheads="1" noChangeShapeType="1" noTextEdit="1"/>
+              </p:cNvSpPr>
+              <p:nvPr/>
+            </p:nvSpPr>
+            <p:spPr>
+              <a:xfrm>
+                <a:off x="6118776" y="751728"/>
+                <a:ext cx="720000" cy="369332"/>
+              </a:xfrm>
+              <a:prstGeom prst="rect">
+                <a:avLst/>
+              </a:prstGeom>
+              <a:blipFill>
+                <a:blip r:embed="rId10"/>
+                <a:stretch>
+                  <a:fillRect/>
+                </a:stretch>
+              </a:blipFill>
+            </p:spPr>
+            <p:txBody>
+              <a:bodyPr/>
+              <a:lstStyle/>
+              <a:p>
+                <a:r>
+                  <a:rPr lang="it-IT">
+                    <a:noFill/>
+                  </a:rPr>
+                  <a:t> </a:t>
+                </a:r>
+              </a:p>
+            </p:txBody>
+          </p:sp>
+        </mc:Fallback>
+      </mc:AlternateContent>
+      <mc:AlternateContent xmlns:mc="http://schemas.openxmlformats.org/markup-compatibility/2006">
+        <mc:Choice xmlns:a14="http://schemas.microsoft.com/office/drawing/2010/main" Requires="a14">
+          <p:sp>
+            <p:nvSpPr>
+              <p:cNvPr id="48" name="CasellaDiTesto 47">
+                <a:extLst>
+                  <a:ext uri="{FF2B5EF4-FFF2-40B4-BE49-F238E27FC236}">
+                    <a16:creationId xmlns:a16="http://schemas.microsoft.com/office/drawing/2014/main" id="{EEF43F02-9CEC-40AD-95D0-852A52B53886}"/>
+                  </a:ext>
+                </a:extLst>
+              </p:cNvPr>
+              <p:cNvSpPr txBox="1"/>
+              <p:nvPr/>
+            </p:nvSpPr>
+            <p:spPr>
+              <a:xfrm>
+                <a:off x="6298778" y="1152000"/>
+                <a:ext cx="540000" cy="369332"/>
+              </a:xfrm>
+              <a:prstGeom prst="rect">
+                <a:avLst/>
+              </a:prstGeom>
+              <a:noFill/>
+            </p:spPr>
+            <p:txBody>
+              <a:bodyPr wrap="square" rtlCol="0">
+                <a:spAutoFit/>
+              </a:bodyPr>
+              <a:lstStyle/>
+              <a:p>
+                <a:pPr algn="ctr"/>
+                <a14:m>
+                  <m:oMathPara xmlns:m="http://schemas.openxmlformats.org/officeDocument/2006/math">
+                    <m:oMathParaPr>
+                      <m:jc m:val="center"/>
+                    </m:oMathParaPr>
+                    <m:oMath xmlns:m="http://schemas.openxmlformats.org/officeDocument/2006/math">
+                      <m:sSub>
+                        <m:sSubPr>
+                          <m:ctrlPr>
+                            <a:rPr lang="el-GR" i="1" smtClean="0">
+                              <a:latin typeface="Cambria Math" panose="02040503050406030204" pitchFamily="18" charset="0"/>
+                            </a:rPr>
+                          </m:ctrlPr>
+                        </m:sSubPr>
+                        <m:e>
+                          <m:r>
+                            <m:rPr>
+                              <m:sty m:val="p"/>
+                            </m:rPr>
+                            <a:rPr lang="el-GR" i="1">
+                              <a:latin typeface="Cambria Math" panose="02040503050406030204" pitchFamily="18" charset="0"/>
+                            </a:rPr>
+                            <m:t>Γ</m:t>
+                          </m:r>
+                        </m:e>
+                        <m:sub>
+                          <m:r>
+                            <m:rPr>
+                              <m:sty m:val="p"/>
+                            </m:rPr>
+                            <a:rPr lang="it-IT" b="0" i="0" smtClean="0">
+                              <a:latin typeface="Cambria Math" panose="02040503050406030204" pitchFamily="18" charset="0"/>
+                            </a:rPr>
+                            <m:t>base</m:t>
+                          </m:r>
+                        </m:sub>
+                      </m:sSub>
+                    </m:oMath>
+                  </m:oMathPara>
+                </a14:m>
+                <a:endParaRPr lang="it-IT" sz="1600" i="1" dirty="0"/>
+              </a:p>
+            </p:txBody>
+          </p:sp>
+        </mc:Choice>
+        <mc:Fallback>
+          <p:sp>
+            <p:nvSpPr>
+              <p:cNvPr id="48" name="CasellaDiTesto 47">
+                <a:extLst>
+                  <a:ext uri="{FF2B5EF4-FFF2-40B4-BE49-F238E27FC236}">
+                    <a16:creationId xmlns:a16="http://schemas.microsoft.com/office/drawing/2014/main" id="{EEF43F02-9CEC-40AD-95D0-852A52B53886}"/>
+                  </a:ext>
+                </a:extLst>
+              </p:cNvPr>
+              <p:cNvSpPr txBox="1">
+                <a:spLocks noRot="1" noChangeAspect="1" noMove="1" noResize="1" noEditPoints="1" noAdjustHandles="1" noChangeArrowheads="1" noChangeShapeType="1" noTextEdit="1"/>
+              </p:cNvSpPr>
+              <p:nvPr/>
+            </p:nvSpPr>
+            <p:spPr>
+              <a:xfrm>
+                <a:off x="6298778" y="1152000"/>
+                <a:ext cx="540000" cy="369332"/>
+              </a:xfrm>
+              <a:prstGeom prst="rect">
+                <a:avLst/>
+              </a:prstGeom>
+              <a:blipFill>
+                <a:blip r:embed="rId11"/>
+                <a:stretch>
+                  <a:fillRect l="-13483"/>
+                </a:stretch>
+              </a:blipFill>
+            </p:spPr>
+            <p:txBody>
+              <a:bodyPr/>
+              <a:lstStyle/>
+              <a:p>
+                <a:r>
+                  <a:rPr lang="it-IT">
+                    <a:noFill/>
+                  </a:rPr>
+                  <a:t> </a:t>
+                </a:r>
+              </a:p>
+            </p:txBody>
+          </p:sp>
+        </mc:Fallback>
+      </mc:AlternateContent>
+    </p:spTree>
+    <p:extLst>
+      <p:ext uri="{BB962C8B-B14F-4D97-AF65-F5344CB8AC3E}">
+        <p14:creationId xmlns:p14="http://schemas.microsoft.com/office/powerpoint/2010/main" val="2494552174"/>
+      </p:ext>
+    </p:extLst>
+  </p:cSld>
+  <p:clrMapOvr>
+    <a:masterClrMapping/>
+  </p:clrMapOvr>
+</p:sld>
+</file>
+
+<file path=ppt/slides/slide15.xml><?xml version="1.0" encoding="utf-8"?>
+<p:sld xmlns:a="http://schemas.openxmlformats.org/drawingml/2006/main" xmlns:r="http://schemas.openxmlformats.org/officeDocument/2006/relationships" xmlns:p="http://schemas.openxmlformats.org/presentationml/2006/main">
+  <p:cSld>
+    <p:spTree>
+      <p:nvGrpSpPr>
+        <p:cNvPr id="1" name=""/>
+        <p:cNvGrpSpPr/>
+        <p:nvPr/>
+      </p:nvGrpSpPr>
+      <p:grpSpPr>
+        <a:xfrm>
+          <a:off x="0" y="0"/>
+          <a:ext cx="0" cy="0"/>
+          <a:chOff x="0" y="0"/>
+          <a:chExt cx="0" cy="0"/>
+        </a:xfrm>
+      </p:grpSpPr>
+      <p:sp>
+        <p:nvSpPr>
           <p:cNvPr id="32" name="CasellaDiTesto 31">
             <a:extLst>
               <a:ext uri="{FF2B5EF4-FFF2-40B4-BE49-F238E27FC236}">
@@ -18130,7 +20192,7 @@
 </p:sld>
 </file>
 
-<file path=ppt/slides/slide15.xml><?xml version="1.0" encoding="utf-8"?>
+<file path=ppt/slides/slide16.xml><?xml version="1.0" encoding="utf-8"?>
 <p:sld xmlns:a="http://schemas.openxmlformats.org/drawingml/2006/main" xmlns:r="http://schemas.openxmlformats.org/officeDocument/2006/relationships" xmlns:p="http://schemas.openxmlformats.org/presentationml/2006/main">
   <p:cSld>
     <p:spTree>
@@ -19671,7 +21733,7 @@
 </p:sld>
 </file>
 
-<file path=ppt/slides/slide16.xml><?xml version="1.0" encoding="utf-8"?>
+<file path=ppt/slides/slide17.xml><?xml version="1.0" encoding="utf-8"?>
 <p:sld xmlns:a="http://schemas.openxmlformats.org/drawingml/2006/main" xmlns:r="http://schemas.openxmlformats.org/officeDocument/2006/relationships" xmlns:p="http://schemas.openxmlformats.org/presentationml/2006/main">
   <p:cSld>
     <p:spTree>
@@ -23111,7 +25173,7 @@
 </p:sld>
 </file>
 
-<file path=ppt/slides/slide17.xml><?xml version="1.0" encoding="utf-8"?>
+<file path=ppt/slides/slide18.xml><?xml version="1.0" encoding="utf-8"?>
 <p:sld xmlns:a="http://schemas.openxmlformats.org/drawingml/2006/main" xmlns:r="http://schemas.openxmlformats.org/officeDocument/2006/relationships" xmlns:p="http://schemas.openxmlformats.org/presentationml/2006/main">
   <p:cSld>
     <p:spTree>
@@ -27477,7 +29539,7 @@
 </p:sld>
 </file>
 
-<file path=ppt/slides/slide18.xml><?xml version="1.0" encoding="utf-8"?>
+<file path=ppt/slides/slide19.xml><?xml version="1.0" encoding="utf-8"?>
 <p:sld xmlns:a="http://schemas.openxmlformats.org/drawingml/2006/main" xmlns:r="http://schemas.openxmlformats.org/officeDocument/2006/relationships" xmlns:p="http://schemas.openxmlformats.org/presentationml/2006/main">
   <p:cSld>
     <p:spTree>
@@ -27945,7 +30007,572 @@
 </p:sld>
 </file>
 
-<file path=ppt/slides/slide19.xml><?xml version="1.0" encoding="utf-8"?>
+<file path=ppt/slides/slide2.xml><?xml version="1.0" encoding="utf-8"?>
+<p:sld xmlns:a="http://schemas.openxmlformats.org/drawingml/2006/main" xmlns:r="http://schemas.openxmlformats.org/officeDocument/2006/relationships" xmlns:p="http://schemas.openxmlformats.org/presentationml/2006/main">
+  <p:cSld>
+    <p:spTree>
+      <p:nvGrpSpPr>
+        <p:cNvPr id="1" name=""/>
+        <p:cNvGrpSpPr/>
+        <p:nvPr/>
+      </p:nvGrpSpPr>
+      <p:grpSpPr>
+        <a:xfrm>
+          <a:off x="0" y="0"/>
+          <a:ext cx="0" cy="0"/>
+          <a:chOff x="0" y="0"/>
+          <a:chExt cx="0" cy="0"/>
+        </a:xfrm>
+      </p:grpSpPr>
+      <p:grpSp>
+        <p:nvGrpSpPr>
+          <p:cNvPr id="14" name="Gruppo 13">
+            <a:extLst>
+              <a:ext uri="{FF2B5EF4-FFF2-40B4-BE49-F238E27FC236}">
+                <a16:creationId xmlns:a16="http://schemas.microsoft.com/office/drawing/2014/main" id="{8B812CBD-3474-4169-9F0B-34C79F892890}"/>
+              </a:ext>
+            </a:extLst>
+          </p:cNvPr>
+          <p:cNvGrpSpPr/>
+          <p:nvPr/>
+        </p:nvGrpSpPr>
+        <p:grpSpPr>
+          <a:xfrm>
+            <a:off x="0" y="127901"/>
+            <a:ext cx="12192000" cy="6602198"/>
+            <a:chOff x="0" y="127901"/>
+            <a:chExt cx="12192000" cy="6602198"/>
+          </a:xfrm>
+        </p:grpSpPr>
+        <p:pic>
+          <p:nvPicPr>
+            <p:cNvPr id="5" name="Immagine 4">
+              <a:extLst>
+                <a:ext uri="{FF2B5EF4-FFF2-40B4-BE49-F238E27FC236}">
+                  <a16:creationId xmlns:a16="http://schemas.microsoft.com/office/drawing/2014/main" id="{D9B810F3-CD02-4810-BA5E-D4CDC2EDDD88}"/>
+                </a:ext>
+              </a:extLst>
+            </p:cNvPr>
+            <p:cNvPicPr>
+              <a:picLocks noChangeAspect="1"/>
+            </p:cNvPicPr>
+            <p:nvPr/>
+          </p:nvPicPr>
+          <p:blipFill>
+            <a:blip r:embed="rId2">
+              <a:extLst>
+                <a:ext uri="{28A0092B-C50C-407E-A947-70E740481C1C}">
+                  <a14:useLocalDpi xmlns:a14="http://schemas.microsoft.com/office/drawing/2010/main" val="0"/>
+                </a:ext>
+              </a:extLst>
+            </a:blip>
+            <a:stretch>
+              <a:fillRect/>
+            </a:stretch>
+          </p:blipFill>
+          <p:spPr>
+            <a:xfrm>
+              <a:off x="0" y="127901"/>
+              <a:ext cx="12192000" cy="6602198"/>
+            </a:xfrm>
+            <a:prstGeom prst="rect">
+              <a:avLst/>
+            </a:prstGeom>
+          </p:spPr>
+        </p:pic>
+        <mc:AlternateContent xmlns:mc="http://schemas.openxmlformats.org/markup-compatibility/2006" xmlns:a14="http://schemas.microsoft.com/office/drawing/2010/main">
+          <mc:Choice Requires="a14">
+            <p:sp>
+              <p:nvSpPr>
+                <p:cNvPr id="6" name="CasellaDiTesto 5">
+                  <a:extLst>
+                    <a:ext uri="{FF2B5EF4-FFF2-40B4-BE49-F238E27FC236}">
+                      <a16:creationId xmlns:a16="http://schemas.microsoft.com/office/drawing/2014/main" id="{059B17EF-F48B-441A-82C0-AB30A82947AF}"/>
+                    </a:ext>
+                  </a:extLst>
+                </p:cNvPr>
+                <p:cNvSpPr txBox="1"/>
+                <p:nvPr/>
+              </p:nvSpPr>
+              <p:spPr>
+                <a:xfrm>
+                  <a:off x="8611297" y="1981295"/>
+                  <a:ext cx="386644" cy="313350"/>
+                </a:xfrm>
+                <a:prstGeom prst="rect">
+                  <a:avLst/>
+                </a:prstGeom>
+                <a:solidFill>
+                  <a:schemeClr val="bg1"/>
+                </a:solidFill>
+                <a:effectLst>
+                  <a:softEdge rad="25400"/>
+                </a:effectLst>
+              </p:spPr>
+              <p:txBody>
+                <a:bodyPr wrap="none" lIns="0" tIns="0" rIns="0" bIns="36000" rtlCol="0">
+                  <a:spAutoFit/>
+                </a:bodyPr>
+                <a:lstStyle/>
+                <a:p>
+                  <a:pPr/>
+                  <a14:m>
+                    <m:oMathPara xmlns:m="http://schemas.openxmlformats.org/officeDocument/2006/math">
+                      <m:oMathParaPr>
+                        <m:jc m:val="centerGroup"/>
+                      </m:oMathParaPr>
+                      <m:oMath xmlns:m="http://schemas.openxmlformats.org/officeDocument/2006/math">
+                        <m:sSub>
+                          <m:sSubPr>
+                            <m:ctrlPr>
+                              <a:rPr lang="el-GR" i="1" smtClean="0">
+                                <a:latin typeface="Cambria Math" panose="02040503050406030204" pitchFamily="18" charset="0"/>
+                                <a:ea typeface="Cambria Math" panose="02040503050406030204" pitchFamily="18" charset="0"/>
+                              </a:rPr>
+                            </m:ctrlPr>
+                          </m:sSubPr>
+                          <m:e>
+                            <m:r>
+                              <m:rPr>
+                                <m:sty m:val="p"/>
+                              </m:rPr>
+                              <a:rPr lang="el-GR" i="1" smtClean="0">
+                                <a:latin typeface="Cambria Math" panose="02040503050406030204" pitchFamily="18" charset="0"/>
+                                <a:ea typeface="Cambria Math" panose="02040503050406030204" pitchFamily="18" charset="0"/>
+                              </a:rPr>
+                              <m:t>Γ</m:t>
+                            </m:r>
+                          </m:e>
+                          <m:sub>
+                            <m:r>
+                              <m:rPr>
+                                <m:sty m:val="p"/>
+                              </m:rPr>
+                              <a:rPr lang="it-IT" b="0" i="0" smtClean="0">
+                                <a:latin typeface="Cambria Math" panose="02040503050406030204" pitchFamily="18" charset="0"/>
+                                <a:ea typeface="Cambria Math" panose="02040503050406030204" pitchFamily="18" charset="0"/>
+                              </a:rPr>
+                              <m:t>int</m:t>
+                            </m:r>
+                          </m:sub>
+                        </m:sSub>
+                      </m:oMath>
+                    </m:oMathPara>
+                  </a14:m>
+                  <a:endParaRPr lang="it-IT" dirty="0"/>
+                </a:p>
+              </p:txBody>
+            </p:sp>
+          </mc:Choice>
+          <mc:Fallback xmlns="">
+            <p:sp>
+              <p:nvSpPr>
+                <p:cNvPr id="6" name="CasellaDiTesto 5">
+                  <a:extLst>
+                    <a:ext uri="{FF2B5EF4-FFF2-40B4-BE49-F238E27FC236}">
+                      <a16:creationId xmlns:a16="http://schemas.microsoft.com/office/drawing/2014/main" id="{059B17EF-F48B-441A-82C0-AB30A82947AF}"/>
+                    </a:ext>
+                  </a:extLst>
+                </p:cNvPr>
+                <p:cNvSpPr txBox="1">
+                  <a:spLocks noRot="1" noChangeAspect="1" noMove="1" noResize="1" noEditPoints="1" noAdjustHandles="1" noChangeArrowheads="1" noChangeShapeType="1" noTextEdit="1"/>
+                </p:cNvSpPr>
+                <p:nvPr/>
+              </p:nvSpPr>
+              <p:spPr>
+                <a:xfrm>
+                  <a:off x="8611297" y="1981295"/>
+                  <a:ext cx="386644" cy="313350"/>
+                </a:xfrm>
+                <a:prstGeom prst="rect">
+                  <a:avLst/>
+                </a:prstGeom>
+                <a:blipFill>
+                  <a:blip r:embed="rId3"/>
+                  <a:stretch>
+                    <a:fillRect l="-14286" r="-7937" b="-5882"/>
+                  </a:stretch>
+                </a:blipFill>
+                <a:effectLst>
+                  <a:softEdge rad="25400"/>
+                </a:effectLst>
+              </p:spPr>
+              <p:txBody>
+                <a:bodyPr/>
+                <a:lstStyle/>
+                <a:p>
+                  <a:r>
+                    <a:rPr lang="it-IT">
+                      <a:noFill/>
+                    </a:rPr>
+                    <a:t> </a:t>
+                  </a:r>
+                </a:p>
+              </p:txBody>
+            </p:sp>
+          </mc:Fallback>
+        </mc:AlternateContent>
+        <mc:AlternateContent xmlns:mc="http://schemas.openxmlformats.org/markup-compatibility/2006" xmlns:a14="http://schemas.microsoft.com/office/drawing/2010/main">
+          <mc:Choice Requires="a14">
+            <p:sp>
+              <p:nvSpPr>
+                <p:cNvPr id="7" name="CasellaDiTesto 6">
+                  <a:extLst>
+                    <a:ext uri="{FF2B5EF4-FFF2-40B4-BE49-F238E27FC236}">
+                      <a16:creationId xmlns:a16="http://schemas.microsoft.com/office/drawing/2014/main" id="{81E6A2B8-ED0B-4759-A64F-C91CD7D604D3}"/>
+                    </a:ext>
+                  </a:extLst>
+                </p:cNvPr>
+                <p:cNvSpPr txBox="1"/>
+                <p:nvPr/>
+              </p:nvSpPr>
+              <p:spPr>
+                <a:xfrm>
+                  <a:off x="11776345" y="213399"/>
+                  <a:ext cx="338169" cy="313350"/>
+                </a:xfrm>
+                <a:prstGeom prst="rect">
+                  <a:avLst/>
+                </a:prstGeom>
+                <a:solidFill>
+                  <a:schemeClr val="bg1"/>
+                </a:solidFill>
+                <a:effectLst>
+                  <a:softEdge rad="25400"/>
+                </a:effectLst>
+              </p:spPr>
+              <p:txBody>
+                <a:bodyPr wrap="none" lIns="0" tIns="0" rIns="0" bIns="36000" rtlCol="0">
+                  <a:spAutoFit/>
+                </a:bodyPr>
+                <a:lstStyle/>
+                <a:p>
+                  <a:pPr/>
+                  <a14:m>
+                    <m:oMathPara xmlns:m="http://schemas.openxmlformats.org/officeDocument/2006/math">
+                      <m:oMathParaPr>
+                        <m:jc m:val="centerGroup"/>
+                      </m:oMathParaPr>
+                      <m:oMath xmlns:m="http://schemas.openxmlformats.org/officeDocument/2006/math">
+                        <m:sSub>
+                          <m:sSubPr>
+                            <m:ctrlPr>
+                              <a:rPr lang="el-GR" i="1" smtClean="0">
+                                <a:latin typeface="Cambria Math" panose="02040503050406030204" pitchFamily="18" charset="0"/>
+                                <a:ea typeface="Cambria Math" panose="02040503050406030204" pitchFamily="18" charset="0"/>
+                              </a:rPr>
+                            </m:ctrlPr>
+                          </m:sSubPr>
+                          <m:e>
+                            <m:r>
+                              <m:rPr>
+                                <m:sty m:val="p"/>
+                              </m:rPr>
+                              <a:rPr lang="el-GR" i="1">
+                                <a:latin typeface="Cambria Math" panose="02040503050406030204" pitchFamily="18" charset="0"/>
+                                <a:ea typeface="Cambria Math" panose="02040503050406030204" pitchFamily="18" charset="0"/>
+                              </a:rPr>
+                              <m:t>Ω</m:t>
+                            </m:r>
+                          </m:e>
+                          <m:sub>
+                            <m:r>
+                              <m:rPr>
+                                <m:sty m:val="p"/>
+                              </m:rPr>
+                              <a:rPr lang="it-IT" b="0" i="0" smtClean="0">
+                                <a:latin typeface="Cambria Math" panose="02040503050406030204" pitchFamily="18" charset="0"/>
+                                <a:ea typeface="Cambria Math" panose="02040503050406030204" pitchFamily="18" charset="0"/>
+                              </a:rPr>
+                              <m:t>ff</m:t>
+                            </m:r>
+                          </m:sub>
+                        </m:sSub>
+                      </m:oMath>
+                    </m:oMathPara>
+                  </a14:m>
+                  <a:endParaRPr lang="it-IT" dirty="0"/>
+                </a:p>
+              </p:txBody>
+            </p:sp>
+          </mc:Choice>
+          <mc:Fallback xmlns="">
+            <p:sp>
+              <p:nvSpPr>
+                <p:cNvPr id="7" name="CasellaDiTesto 6">
+                  <a:extLst>
+                    <a:ext uri="{FF2B5EF4-FFF2-40B4-BE49-F238E27FC236}">
+                      <a16:creationId xmlns:a16="http://schemas.microsoft.com/office/drawing/2014/main" id="{81E6A2B8-ED0B-4759-A64F-C91CD7D604D3}"/>
+                    </a:ext>
+                  </a:extLst>
+                </p:cNvPr>
+                <p:cNvSpPr txBox="1">
+                  <a:spLocks noRot="1" noChangeAspect="1" noMove="1" noResize="1" noEditPoints="1" noAdjustHandles="1" noChangeArrowheads="1" noChangeShapeType="1" noTextEdit="1"/>
+                </p:cNvSpPr>
+                <p:nvPr/>
+              </p:nvSpPr>
+              <p:spPr>
+                <a:xfrm>
+                  <a:off x="11776345" y="213399"/>
+                  <a:ext cx="338169" cy="313350"/>
+                </a:xfrm>
+                <a:prstGeom prst="rect">
+                  <a:avLst/>
+                </a:prstGeom>
+                <a:blipFill>
+                  <a:blip r:embed="rId4"/>
+                  <a:stretch>
+                    <a:fillRect l="-16364" r="-9091" b="-5882"/>
+                  </a:stretch>
+                </a:blipFill>
+                <a:effectLst>
+                  <a:softEdge rad="25400"/>
+                </a:effectLst>
+              </p:spPr>
+              <p:txBody>
+                <a:bodyPr/>
+                <a:lstStyle/>
+                <a:p>
+                  <a:r>
+                    <a:rPr lang="it-IT">
+                      <a:noFill/>
+                    </a:rPr>
+                    <a:t> </a:t>
+                  </a:r>
+                </a:p>
+              </p:txBody>
+            </p:sp>
+          </mc:Fallback>
+        </mc:AlternateContent>
+        <mc:AlternateContent xmlns:mc="http://schemas.openxmlformats.org/markup-compatibility/2006" xmlns:a14="http://schemas.microsoft.com/office/drawing/2010/main">
+          <mc:Choice Requires="a14">
+            <p:sp>
+              <p:nvSpPr>
+                <p:cNvPr id="8" name="CasellaDiTesto 7">
+                  <a:extLst>
+                    <a:ext uri="{FF2B5EF4-FFF2-40B4-BE49-F238E27FC236}">
+                      <a16:creationId xmlns:a16="http://schemas.microsoft.com/office/drawing/2014/main" id="{82DB9C2A-36AA-4731-9791-B815F73AAD52}"/>
+                    </a:ext>
+                  </a:extLst>
+                </p:cNvPr>
+                <p:cNvSpPr txBox="1"/>
+                <p:nvPr/>
+              </p:nvSpPr>
+              <p:spPr>
+                <a:xfrm>
+                  <a:off x="11633677" y="5675870"/>
+                  <a:ext cx="480837" cy="338037"/>
+                </a:xfrm>
+                <a:prstGeom prst="rect">
+                  <a:avLst/>
+                </a:prstGeom>
+                <a:solidFill>
+                  <a:schemeClr val="bg1"/>
+                </a:solidFill>
+                <a:effectLst>
+                  <a:softEdge rad="25400"/>
+                </a:effectLst>
+              </p:spPr>
+              <p:txBody>
+                <a:bodyPr wrap="none" lIns="0" tIns="0" rIns="0" bIns="36000" rtlCol="0">
+                  <a:spAutoFit/>
+                </a:bodyPr>
+                <a:lstStyle/>
+                <a:p>
+                  <a:pPr/>
+                  <a14:m>
+                    <m:oMathPara xmlns:m="http://schemas.openxmlformats.org/officeDocument/2006/math">
+                      <m:oMathParaPr>
+                        <m:jc m:val="centerGroup"/>
+                      </m:oMathParaPr>
+                      <m:oMath xmlns:m="http://schemas.openxmlformats.org/officeDocument/2006/math">
+                        <m:sSub>
+                          <m:sSubPr>
+                            <m:ctrlPr>
+                              <a:rPr lang="el-GR" i="1" smtClean="0">
+                                <a:latin typeface="Cambria Math" panose="02040503050406030204" pitchFamily="18" charset="0"/>
+                                <a:ea typeface="Cambria Math" panose="02040503050406030204" pitchFamily="18" charset="0"/>
+                              </a:rPr>
+                            </m:ctrlPr>
+                          </m:sSubPr>
+                          <m:e>
+                            <m:r>
+                              <m:rPr>
+                                <m:sty m:val="p"/>
+                              </m:rPr>
+                              <a:rPr lang="el-GR" i="1">
+                                <a:latin typeface="Cambria Math" panose="02040503050406030204" pitchFamily="18" charset="0"/>
+                                <a:ea typeface="Cambria Math" panose="02040503050406030204" pitchFamily="18" charset="0"/>
+                              </a:rPr>
+                              <m:t>Ω</m:t>
+                            </m:r>
+                          </m:e>
+                          <m:sub>
+                            <m:r>
+                              <m:rPr>
+                                <m:sty m:val="p"/>
+                              </m:rPr>
+                              <a:rPr lang="it-IT" b="0" i="0" smtClean="0">
+                                <a:latin typeface="Cambria Math" panose="02040503050406030204" pitchFamily="18" charset="0"/>
+                                <a:ea typeface="Cambria Math" panose="02040503050406030204" pitchFamily="18" charset="0"/>
+                              </a:rPr>
+                              <m:t>pm</m:t>
+                            </m:r>
+                          </m:sub>
+                        </m:sSub>
+                      </m:oMath>
+                    </m:oMathPara>
+                  </a14:m>
+                  <a:endParaRPr lang="it-IT" dirty="0"/>
+                </a:p>
+              </p:txBody>
+            </p:sp>
+          </mc:Choice>
+          <mc:Fallback xmlns="">
+            <p:sp>
+              <p:nvSpPr>
+                <p:cNvPr id="8" name="CasellaDiTesto 7">
+                  <a:extLst>
+                    <a:ext uri="{FF2B5EF4-FFF2-40B4-BE49-F238E27FC236}">
+                      <a16:creationId xmlns:a16="http://schemas.microsoft.com/office/drawing/2014/main" id="{82DB9C2A-36AA-4731-9791-B815F73AAD52}"/>
+                    </a:ext>
+                  </a:extLst>
+                </p:cNvPr>
+                <p:cNvSpPr txBox="1">
+                  <a:spLocks noRot="1" noChangeAspect="1" noMove="1" noResize="1" noEditPoints="1" noAdjustHandles="1" noChangeArrowheads="1" noChangeShapeType="1" noTextEdit="1"/>
+                </p:cNvSpPr>
+                <p:nvPr/>
+              </p:nvSpPr>
+              <p:spPr>
+                <a:xfrm>
+                  <a:off x="11633677" y="5675870"/>
+                  <a:ext cx="480837" cy="338037"/>
+                </a:xfrm>
+                <a:prstGeom prst="rect">
+                  <a:avLst/>
+                </a:prstGeom>
+                <a:blipFill>
+                  <a:blip r:embed="rId5"/>
+                  <a:stretch>
+                    <a:fillRect l="-10127" r="-7595" b="-8929"/>
+                  </a:stretch>
+                </a:blipFill>
+                <a:effectLst>
+                  <a:softEdge rad="25400"/>
+                </a:effectLst>
+              </p:spPr>
+              <p:txBody>
+                <a:bodyPr/>
+                <a:lstStyle/>
+                <a:p>
+                  <a:r>
+                    <a:rPr lang="it-IT">
+                      <a:noFill/>
+                    </a:rPr>
+                    <a:t> </a:t>
+                  </a:r>
+                </a:p>
+              </p:txBody>
+            </p:sp>
+          </mc:Fallback>
+        </mc:AlternateContent>
+        <p:cxnSp>
+          <p:nvCxnSpPr>
+            <p:cNvPr id="9" name="Connettore diritto 8">
+              <a:extLst>
+                <a:ext uri="{FF2B5EF4-FFF2-40B4-BE49-F238E27FC236}">
+                  <a16:creationId xmlns:a16="http://schemas.microsoft.com/office/drawing/2014/main" id="{F68B01F5-A184-4F0B-9017-35092B4FA318}"/>
+                </a:ext>
+              </a:extLst>
+            </p:cNvPr>
+            <p:cNvCxnSpPr>
+              <a:cxnSpLocks/>
+            </p:cNvCxnSpPr>
+            <p:nvPr/>
+          </p:nvCxnSpPr>
+          <p:spPr>
+            <a:xfrm>
+              <a:off x="9068937" y="873804"/>
+              <a:ext cx="3123063" cy="0"/>
+            </a:xfrm>
+            <a:prstGeom prst="line">
+              <a:avLst/>
+            </a:prstGeom>
+            <a:ln w="28575">
+              <a:prstDash val="dash"/>
+            </a:ln>
+          </p:spPr>
+          <p:style>
+            <a:lnRef idx="1">
+              <a:schemeClr val="dk1"/>
+            </a:lnRef>
+            <a:fillRef idx="0">
+              <a:schemeClr val="dk1"/>
+            </a:fillRef>
+            <a:effectRef idx="0">
+              <a:schemeClr val="dk1"/>
+            </a:effectRef>
+            <a:fontRef idx="minor">
+              <a:schemeClr val="tx1"/>
+            </a:fontRef>
+          </p:style>
+        </p:cxnSp>
+        <p:cxnSp>
+          <p:nvCxnSpPr>
+            <p:cNvPr id="11" name="Connettore diritto 10">
+              <a:extLst>
+                <a:ext uri="{FF2B5EF4-FFF2-40B4-BE49-F238E27FC236}">
+                  <a16:creationId xmlns:a16="http://schemas.microsoft.com/office/drawing/2014/main" id="{A3770720-FC61-40D3-BCF7-E7FCBDE3A234}"/>
+                </a:ext>
+              </a:extLst>
+            </p:cNvPr>
+            <p:cNvCxnSpPr>
+              <a:cxnSpLocks/>
+            </p:cNvCxnSpPr>
+            <p:nvPr/>
+          </p:nvCxnSpPr>
+          <p:spPr>
+            <a:xfrm>
+              <a:off x="9085280" y="880628"/>
+              <a:ext cx="0" cy="5226745"/>
+            </a:xfrm>
+            <a:prstGeom prst="line">
+              <a:avLst/>
+            </a:prstGeom>
+            <a:ln w="28575">
+              <a:prstDash val="dash"/>
+            </a:ln>
+          </p:spPr>
+          <p:style>
+            <a:lnRef idx="1">
+              <a:schemeClr val="dk1"/>
+            </a:lnRef>
+            <a:fillRef idx="0">
+              <a:schemeClr val="dk1"/>
+            </a:fillRef>
+            <a:effectRef idx="0">
+              <a:schemeClr val="dk1"/>
+            </a:effectRef>
+            <a:fontRef idx="minor">
+              <a:schemeClr val="tx1"/>
+            </a:fontRef>
+          </p:style>
+        </p:cxnSp>
+      </p:grpSp>
+    </p:spTree>
+    <p:extLst>
+      <p:ext uri="{BB962C8B-B14F-4D97-AF65-F5344CB8AC3E}">
+        <p14:creationId xmlns:p14="http://schemas.microsoft.com/office/powerpoint/2010/main" val="1180342296"/>
+      </p:ext>
+    </p:extLst>
+  </p:cSld>
+  <p:clrMapOvr>
+    <a:masterClrMapping/>
+  </p:clrMapOvr>
+</p:sld>
+</file>
+
+<file path=ppt/slides/slide20.xml><?xml version="1.0" encoding="utf-8"?>
 <p:sld xmlns:a="http://schemas.openxmlformats.org/drawingml/2006/main" xmlns:r="http://schemas.openxmlformats.org/officeDocument/2006/relationships" xmlns:p="http://schemas.openxmlformats.org/presentationml/2006/main">
   <p:cSld>
     <p:spTree>
@@ -29154,572 +31781,7 @@
 </p:sld>
 </file>
 
-<file path=ppt/slides/slide2.xml><?xml version="1.0" encoding="utf-8"?>
-<p:sld xmlns:a="http://schemas.openxmlformats.org/drawingml/2006/main" xmlns:r="http://schemas.openxmlformats.org/officeDocument/2006/relationships" xmlns:p="http://schemas.openxmlformats.org/presentationml/2006/main">
-  <p:cSld>
-    <p:spTree>
-      <p:nvGrpSpPr>
-        <p:cNvPr id="1" name=""/>
-        <p:cNvGrpSpPr/>
-        <p:nvPr/>
-      </p:nvGrpSpPr>
-      <p:grpSpPr>
-        <a:xfrm>
-          <a:off x="0" y="0"/>
-          <a:ext cx="0" cy="0"/>
-          <a:chOff x="0" y="0"/>
-          <a:chExt cx="0" cy="0"/>
-        </a:xfrm>
-      </p:grpSpPr>
-      <p:grpSp>
-        <p:nvGrpSpPr>
-          <p:cNvPr id="14" name="Gruppo 13">
-            <a:extLst>
-              <a:ext uri="{FF2B5EF4-FFF2-40B4-BE49-F238E27FC236}">
-                <a16:creationId xmlns:a16="http://schemas.microsoft.com/office/drawing/2014/main" id="{8B812CBD-3474-4169-9F0B-34C79F892890}"/>
-              </a:ext>
-            </a:extLst>
-          </p:cNvPr>
-          <p:cNvGrpSpPr/>
-          <p:nvPr/>
-        </p:nvGrpSpPr>
-        <p:grpSpPr>
-          <a:xfrm>
-            <a:off x="0" y="127901"/>
-            <a:ext cx="12192000" cy="6602198"/>
-            <a:chOff x="0" y="127901"/>
-            <a:chExt cx="12192000" cy="6602198"/>
-          </a:xfrm>
-        </p:grpSpPr>
-        <p:pic>
-          <p:nvPicPr>
-            <p:cNvPr id="5" name="Immagine 4">
-              <a:extLst>
-                <a:ext uri="{FF2B5EF4-FFF2-40B4-BE49-F238E27FC236}">
-                  <a16:creationId xmlns:a16="http://schemas.microsoft.com/office/drawing/2014/main" id="{D9B810F3-CD02-4810-BA5E-D4CDC2EDDD88}"/>
-                </a:ext>
-              </a:extLst>
-            </p:cNvPr>
-            <p:cNvPicPr>
-              <a:picLocks noChangeAspect="1"/>
-            </p:cNvPicPr>
-            <p:nvPr/>
-          </p:nvPicPr>
-          <p:blipFill>
-            <a:blip r:embed="rId2">
-              <a:extLst>
-                <a:ext uri="{28A0092B-C50C-407E-A947-70E740481C1C}">
-                  <a14:useLocalDpi xmlns:a14="http://schemas.microsoft.com/office/drawing/2010/main" val="0"/>
-                </a:ext>
-              </a:extLst>
-            </a:blip>
-            <a:stretch>
-              <a:fillRect/>
-            </a:stretch>
-          </p:blipFill>
-          <p:spPr>
-            <a:xfrm>
-              <a:off x="0" y="127901"/>
-              <a:ext cx="12192000" cy="6602198"/>
-            </a:xfrm>
-            <a:prstGeom prst="rect">
-              <a:avLst/>
-            </a:prstGeom>
-          </p:spPr>
-        </p:pic>
-        <mc:AlternateContent xmlns:mc="http://schemas.openxmlformats.org/markup-compatibility/2006">
-          <mc:Choice xmlns:a14="http://schemas.microsoft.com/office/drawing/2010/main" Requires="a14">
-            <p:sp>
-              <p:nvSpPr>
-                <p:cNvPr id="6" name="CasellaDiTesto 5">
-                  <a:extLst>
-                    <a:ext uri="{FF2B5EF4-FFF2-40B4-BE49-F238E27FC236}">
-                      <a16:creationId xmlns:a16="http://schemas.microsoft.com/office/drawing/2014/main" id="{059B17EF-F48B-441A-82C0-AB30A82947AF}"/>
-                    </a:ext>
-                  </a:extLst>
-                </p:cNvPr>
-                <p:cNvSpPr txBox="1"/>
-                <p:nvPr/>
-              </p:nvSpPr>
-              <p:spPr>
-                <a:xfrm>
-                  <a:off x="8611297" y="1981295"/>
-                  <a:ext cx="386644" cy="313350"/>
-                </a:xfrm>
-                <a:prstGeom prst="rect">
-                  <a:avLst/>
-                </a:prstGeom>
-                <a:solidFill>
-                  <a:schemeClr val="bg1"/>
-                </a:solidFill>
-                <a:effectLst>
-                  <a:softEdge rad="25400"/>
-                </a:effectLst>
-              </p:spPr>
-              <p:txBody>
-                <a:bodyPr wrap="none" lIns="0" tIns="0" rIns="0" bIns="36000" rtlCol="0">
-                  <a:spAutoFit/>
-                </a:bodyPr>
-                <a:lstStyle/>
-                <a:p>
-                  <a:pPr/>
-                  <a14:m>
-                    <m:oMathPara xmlns:m="http://schemas.openxmlformats.org/officeDocument/2006/math">
-                      <m:oMathParaPr>
-                        <m:jc m:val="centerGroup"/>
-                      </m:oMathParaPr>
-                      <m:oMath xmlns:m="http://schemas.openxmlformats.org/officeDocument/2006/math">
-                        <m:sSub>
-                          <m:sSubPr>
-                            <m:ctrlPr>
-                              <a:rPr lang="el-GR" i="1" smtClean="0">
-                                <a:latin typeface="Cambria Math" panose="02040503050406030204" pitchFamily="18" charset="0"/>
-                                <a:ea typeface="Cambria Math" panose="02040503050406030204" pitchFamily="18" charset="0"/>
-                              </a:rPr>
-                            </m:ctrlPr>
-                          </m:sSubPr>
-                          <m:e>
-                            <m:r>
-                              <m:rPr>
-                                <m:sty m:val="p"/>
-                              </m:rPr>
-                              <a:rPr lang="el-GR" i="1" smtClean="0">
-                                <a:latin typeface="Cambria Math" panose="02040503050406030204" pitchFamily="18" charset="0"/>
-                                <a:ea typeface="Cambria Math" panose="02040503050406030204" pitchFamily="18" charset="0"/>
-                              </a:rPr>
-                              <m:t>Γ</m:t>
-                            </m:r>
-                          </m:e>
-                          <m:sub>
-                            <m:r>
-                              <m:rPr>
-                                <m:sty m:val="p"/>
-                              </m:rPr>
-                              <a:rPr lang="it-IT" b="0" i="0" smtClean="0">
-                                <a:latin typeface="Cambria Math" panose="02040503050406030204" pitchFamily="18" charset="0"/>
-                                <a:ea typeface="Cambria Math" panose="02040503050406030204" pitchFamily="18" charset="0"/>
-                              </a:rPr>
-                              <m:t>int</m:t>
-                            </m:r>
-                          </m:sub>
-                        </m:sSub>
-                      </m:oMath>
-                    </m:oMathPara>
-                  </a14:m>
-                  <a:endParaRPr lang="it-IT" dirty="0"/>
-                </a:p>
-              </p:txBody>
-            </p:sp>
-          </mc:Choice>
-          <mc:Fallback>
-            <p:sp>
-              <p:nvSpPr>
-                <p:cNvPr id="6" name="CasellaDiTesto 5">
-                  <a:extLst>
-                    <a:ext uri="{FF2B5EF4-FFF2-40B4-BE49-F238E27FC236}">
-                      <a16:creationId xmlns:a16="http://schemas.microsoft.com/office/drawing/2014/main" id="{059B17EF-F48B-441A-82C0-AB30A82947AF}"/>
-                    </a:ext>
-                  </a:extLst>
-                </p:cNvPr>
-                <p:cNvSpPr txBox="1">
-                  <a:spLocks noRot="1" noChangeAspect="1" noMove="1" noResize="1" noEditPoints="1" noAdjustHandles="1" noChangeArrowheads="1" noChangeShapeType="1" noTextEdit="1"/>
-                </p:cNvSpPr>
-                <p:nvPr/>
-              </p:nvSpPr>
-              <p:spPr>
-                <a:xfrm>
-                  <a:off x="8611297" y="1981295"/>
-                  <a:ext cx="386644" cy="313350"/>
-                </a:xfrm>
-                <a:prstGeom prst="rect">
-                  <a:avLst/>
-                </a:prstGeom>
-                <a:blipFill>
-                  <a:blip r:embed="rId3"/>
-                  <a:stretch>
-                    <a:fillRect l="-14286" r="-7937" b="-5882"/>
-                  </a:stretch>
-                </a:blipFill>
-                <a:effectLst>
-                  <a:softEdge rad="25400"/>
-                </a:effectLst>
-              </p:spPr>
-              <p:txBody>
-                <a:bodyPr/>
-                <a:lstStyle/>
-                <a:p>
-                  <a:r>
-                    <a:rPr lang="it-IT">
-                      <a:noFill/>
-                    </a:rPr>
-                    <a:t> </a:t>
-                  </a:r>
-                </a:p>
-              </p:txBody>
-            </p:sp>
-          </mc:Fallback>
-        </mc:AlternateContent>
-        <mc:AlternateContent xmlns:mc="http://schemas.openxmlformats.org/markup-compatibility/2006">
-          <mc:Choice xmlns:a14="http://schemas.microsoft.com/office/drawing/2010/main" Requires="a14">
-            <p:sp>
-              <p:nvSpPr>
-                <p:cNvPr id="7" name="CasellaDiTesto 6">
-                  <a:extLst>
-                    <a:ext uri="{FF2B5EF4-FFF2-40B4-BE49-F238E27FC236}">
-                      <a16:creationId xmlns:a16="http://schemas.microsoft.com/office/drawing/2014/main" id="{81E6A2B8-ED0B-4759-A64F-C91CD7D604D3}"/>
-                    </a:ext>
-                  </a:extLst>
-                </p:cNvPr>
-                <p:cNvSpPr txBox="1"/>
-                <p:nvPr/>
-              </p:nvSpPr>
-              <p:spPr>
-                <a:xfrm>
-                  <a:off x="11776345" y="213399"/>
-                  <a:ext cx="338169" cy="313350"/>
-                </a:xfrm>
-                <a:prstGeom prst="rect">
-                  <a:avLst/>
-                </a:prstGeom>
-                <a:solidFill>
-                  <a:schemeClr val="bg1"/>
-                </a:solidFill>
-                <a:effectLst>
-                  <a:softEdge rad="25400"/>
-                </a:effectLst>
-              </p:spPr>
-              <p:txBody>
-                <a:bodyPr wrap="none" lIns="0" tIns="0" rIns="0" bIns="36000" rtlCol="0">
-                  <a:spAutoFit/>
-                </a:bodyPr>
-                <a:lstStyle/>
-                <a:p>
-                  <a:pPr/>
-                  <a14:m>
-                    <m:oMathPara xmlns:m="http://schemas.openxmlformats.org/officeDocument/2006/math">
-                      <m:oMathParaPr>
-                        <m:jc m:val="centerGroup"/>
-                      </m:oMathParaPr>
-                      <m:oMath xmlns:m="http://schemas.openxmlformats.org/officeDocument/2006/math">
-                        <m:sSub>
-                          <m:sSubPr>
-                            <m:ctrlPr>
-                              <a:rPr lang="el-GR" i="1" smtClean="0">
-                                <a:latin typeface="Cambria Math" panose="02040503050406030204" pitchFamily="18" charset="0"/>
-                                <a:ea typeface="Cambria Math" panose="02040503050406030204" pitchFamily="18" charset="0"/>
-                              </a:rPr>
-                            </m:ctrlPr>
-                          </m:sSubPr>
-                          <m:e>
-                            <m:r>
-                              <m:rPr>
-                                <m:sty m:val="p"/>
-                              </m:rPr>
-                              <a:rPr lang="el-GR" i="1">
-                                <a:latin typeface="Cambria Math" panose="02040503050406030204" pitchFamily="18" charset="0"/>
-                                <a:ea typeface="Cambria Math" panose="02040503050406030204" pitchFamily="18" charset="0"/>
-                              </a:rPr>
-                              <m:t>Ω</m:t>
-                            </m:r>
-                          </m:e>
-                          <m:sub>
-                            <m:r>
-                              <m:rPr>
-                                <m:sty m:val="p"/>
-                              </m:rPr>
-                              <a:rPr lang="it-IT" b="0" i="0" smtClean="0">
-                                <a:latin typeface="Cambria Math" panose="02040503050406030204" pitchFamily="18" charset="0"/>
-                                <a:ea typeface="Cambria Math" panose="02040503050406030204" pitchFamily="18" charset="0"/>
-                              </a:rPr>
-                              <m:t>ff</m:t>
-                            </m:r>
-                          </m:sub>
-                        </m:sSub>
-                      </m:oMath>
-                    </m:oMathPara>
-                  </a14:m>
-                  <a:endParaRPr lang="it-IT" dirty="0"/>
-                </a:p>
-              </p:txBody>
-            </p:sp>
-          </mc:Choice>
-          <mc:Fallback>
-            <p:sp>
-              <p:nvSpPr>
-                <p:cNvPr id="7" name="CasellaDiTesto 6">
-                  <a:extLst>
-                    <a:ext uri="{FF2B5EF4-FFF2-40B4-BE49-F238E27FC236}">
-                      <a16:creationId xmlns:a16="http://schemas.microsoft.com/office/drawing/2014/main" id="{81E6A2B8-ED0B-4759-A64F-C91CD7D604D3}"/>
-                    </a:ext>
-                  </a:extLst>
-                </p:cNvPr>
-                <p:cNvSpPr txBox="1">
-                  <a:spLocks noRot="1" noChangeAspect="1" noMove="1" noResize="1" noEditPoints="1" noAdjustHandles="1" noChangeArrowheads="1" noChangeShapeType="1" noTextEdit="1"/>
-                </p:cNvSpPr>
-                <p:nvPr/>
-              </p:nvSpPr>
-              <p:spPr>
-                <a:xfrm>
-                  <a:off x="11776345" y="213399"/>
-                  <a:ext cx="338169" cy="313350"/>
-                </a:xfrm>
-                <a:prstGeom prst="rect">
-                  <a:avLst/>
-                </a:prstGeom>
-                <a:blipFill>
-                  <a:blip r:embed="rId4"/>
-                  <a:stretch>
-                    <a:fillRect l="-16364" r="-9091" b="-5882"/>
-                  </a:stretch>
-                </a:blipFill>
-                <a:effectLst>
-                  <a:softEdge rad="25400"/>
-                </a:effectLst>
-              </p:spPr>
-              <p:txBody>
-                <a:bodyPr/>
-                <a:lstStyle/>
-                <a:p>
-                  <a:r>
-                    <a:rPr lang="it-IT">
-                      <a:noFill/>
-                    </a:rPr>
-                    <a:t> </a:t>
-                  </a:r>
-                </a:p>
-              </p:txBody>
-            </p:sp>
-          </mc:Fallback>
-        </mc:AlternateContent>
-        <mc:AlternateContent xmlns:mc="http://schemas.openxmlformats.org/markup-compatibility/2006">
-          <mc:Choice xmlns:a14="http://schemas.microsoft.com/office/drawing/2010/main" Requires="a14">
-            <p:sp>
-              <p:nvSpPr>
-                <p:cNvPr id="8" name="CasellaDiTesto 7">
-                  <a:extLst>
-                    <a:ext uri="{FF2B5EF4-FFF2-40B4-BE49-F238E27FC236}">
-                      <a16:creationId xmlns:a16="http://schemas.microsoft.com/office/drawing/2014/main" id="{82DB9C2A-36AA-4731-9791-B815F73AAD52}"/>
-                    </a:ext>
-                  </a:extLst>
-                </p:cNvPr>
-                <p:cNvSpPr txBox="1"/>
-                <p:nvPr/>
-              </p:nvSpPr>
-              <p:spPr>
-                <a:xfrm>
-                  <a:off x="11633677" y="5675870"/>
-                  <a:ext cx="480837" cy="338037"/>
-                </a:xfrm>
-                <a:prstGeom prst="rect">
-                  <a:avLst/>
-                </a:prstGeom>
-                <a:solidFill>
-                  <a:schemeClr val="bg1"/>
-                </a:solidFill>
-                <a:effectLst>
-                  <a:softEdge rad="25400"/>
-                </a:effectLst>
-              </p:spPr>
-              <p:txBody>
-                <a:bodyPr wrap="none" lIns="0" tIns="0" rIns="0" bIns="36000" rtlCol="0">
-                  <a:spAutoFit/>
-                </a:bodyPr>
-                <a:lstStyle/>
-                <a:p>
-                  <a:pPr/>
-                  <a14:m>
-                    <m:oMathPara xmlns:m="http://schemas.openxmlformats.org/officeDocument/2006/math">
-                      <m:oMathParaPr>
-                        <m:jc m:val="centerGroup"/>
-                      </m:oMathParaPr>
-                      <m:oMath xmlns:m="http://schemas.openxmlformats.org/officeDocument/2006/math">
-                        <m:sSub>
-                          <m:sSubPr>
-                            <m:ctrlPr>
-                              <a:rPr lang="el-GR" i="1" smtClean="0">
-                                <a:latin typeface="Cambria Math" panose="02040503050406030204" pitchFamily="18" charset="0"/>
-                                <a:ea typeface="Cambria Math" panose="02040503050406030204" pitchFamily="18" charset="0"/>
-                              </a:rPr>
-                            </m:ctrlPr>
-                          </m:sSubPr>
-                          <m:e>
-                            <m:r>
-                              <m:rPr>
-                                <m:sty m:val="p"/>
-                              </m:rPr>
-                              <a:rPr lang="el-GR" i="1">
-                                <a:latin typeface="Cambria Math" panose="02040503050406030204" pitchFamily="18" charset="0"/>
-                                <a:ea typeface="Cambria Math" panose="02040503050406030204" pitchFamily="18" charset="0"/>
-                              </a:rPr>
-                              <m:t>Ω</m:t>
-                            </m:r>
-                          </m:e>
-                          <m:sub>
-                            <m:r>
-                              <m:rPr>
-                                <m:sty m:val="p"/>
-                              </m:rPr>
-                              <a:rPr lang="it-IT" b="0" i="0" smtClean="0">
-                                <a:latin typeface="Cambria Math" panose="02040503050406030204" pitchFamily="18" charset="0"/>
-                                <a:ea typeface="Cambria Math" panose="02040503050406030204" pitchFamily="18" charset="0"/>
-                              </a:rPr>
-                              <m:t>pm</m:t>
-                            </m:r>
-                          </m:sub>
-                        </m:sSub>
-                      </m:oMath>
-                    </m:oMathPara>
-                  </a14:m>
-                  <a:endParaRPr lang="it-IT" dirty="0"/>
-                </a:p>
-              </p:txBody>
-            </p:sp>
-          </mc:Choice>
-          <mc:Fallback>
-            <p:sp>
-              <p:nvSpPr>
-                <p:cNvPr id="8" name="CasellaDiTesto 7">
-                  <a:extLst>
-                    <a:ext uri="{FF2B5EF4-FFF2-40B4-BE49-F238E27FC236}">
-                      <a16:creationId xmlns:a16="http://schemas.microsoft.com/office/drawing/2014/main" id="{82DB9C2A-36AA-4731-9791-B815F73AAD52}"/>
-                    </a:ext>
-                  </a:extLst>
-                </p:cNvPr>
-                <p:cNvSpPr txBox="1">
-                  <a:spLocks noRot="1" noChangeAspect="1" noMove="1" noResize="1" noEditPoints="1" noAdjustHandles="1" noChangeArrowheads="1" noChangeShapeType="1" noTextEdit="1"/>
-                </p:cNvSpPr>
-                <p:nvPr/>
-              </p:nvSpPr>
-              <p:spPr>
-                <a:xfrm>
-                  <a:off x="11633677" y="5675870"/>
-                  <a:ext cx="480837" cy="338037"/>
-                </a:xfrm>
-                <a:prstGeom prst="rect">
-                  <a:avLst/>
-                </a:prstGeom>
-                <a:blipFill>
-                  <a:blip r:embed="rId5"/>
-                  <a:stretch>
-                    <a:fillRect l="-10127" r="-7595" b="-8929"/>
-                  </a:stretch>
-                </a:blipFill>
-                <a:effectLst>
-                  <a:softEdge rad="25400"/>
-                </a:effectLst>
-              </p:spPr>
-              <p:txBody>
-                <a:bodyPr/>
-                <a:lstStyle/>
-                <a:p>
-                  <a:r>
-                    <a:rPr lang="it-IT">
-                      <a:noFill/>
-                    </a:rPr>
-                    <a:t> </a:t>
-                  </a:r>
-                </a:p>
-              </p:txBody>
-            </p:sp>
-          </mc:Fallback>
-        </mc:AlternateContent>
-        <p:cxnSp>
-          <p:nvCxnSpPr>
-            <p:cNvPr id="9" name="Connettore diritto 8">
-              <a:extLst>
-                <a:ext uri="{FF2B5EF4-FFF2-40B4-BE49-F238E27FC236}">
-                  <a16:creationId xmlns:a16="http://schemas.microsoft.com/office/drawing/2014/main" id="{F68B01F5-A184-4F0B-9017-35092B4FA318}"/>
-                </a:ext>
-              </a:extLst>
-            </p:cNvPr>
-            <p:cNvCxnSpPr>
-              <a:cxnSpLocks/>
-            </p:cNvCxnSpPr>
-            <p:nvPr/>
-          </p:nvCxnSpPr>
-          <p:spPr>
-            <a:xfrm>
-              <a:off x="9068937" y="873804"/>
-              <a:ext cx="3123063" cy="0"/>
-            </a:xfrm>
-            <a:prstGeom prst="line">
-              <a:avLst/>
-            </a:prstGeom>
-            <a:ln w="28575">
-              <a:prstDash val="dash"/>
-            </a:ln>
-          </p:spPr>
-          <p:style>
-            <a:lnRef idx="1">
-              <a:schemeClr val="dk1"/>
-            </a:lnRef>
-            <a:fillRef idx="0">
-              <a:schemeClr val="dk1"/>
-            </a:fillRef>
-            <a:effectRef idx="0">
-              <a:schemeClr val="dk1"/>
-            </a:effectRef>
-            <a:fontRef idx="minor">
-              <a:schemeClr val="tx1"/>
-            </a:fontRef>
-          </p:style>
-        </p:cxnSp>
-        <p:cxnSp>
-          <p:nvCxnSpPr>
-            <p:cNvPr id="11" name="Connettore diritto 10">
-              <a:extLst>
-                <a:ext uri="{FF2B5EF4-FFF2-40B4-BE49-F238E27FC236}">
-                  <a16:creationId xmlns:a16="http://schemas.microsoft.com/office/drawing/2014/main" id="{A3770720-FC61-40D3-BCF7-E7FCBDE3A234}"/>
-                </a:ext>
-              </a:extLst>
-            </p:cNvPr>
-            <p:cNvCxnSpPr>
-              <a:cxnSpLocks/>
-            </p:cNvCxnSpPr>
-            <p:nvPr/>
-          </p:nvCxnSpPr>
-          <p:spPr>
-            <a:xfrm>
-              <a:off x="9085280" y="880628"/>
-              <a:ext cx="0" cy="5226745"/>
-            </a:xfrm>
-            <a:prstGeom prst="line">
-              <a:avLst/>
-            </a:prstGeom>
-            <a:ln w="28575">
-              <a:prstDash val="dash"/>
-            </a:ln>
-          </p:spPr>
-          <p:style>
-            <a:lnRef idx="1">
-              <a:schemeClr val="dk1"/>
-            </a:lnRef>
-            <a:fillRef idx="0">
-              <a:schemeClr val="dk1"/>
-            </a:fillRef>
-            <a:effectRef idx="0">
-              <a:schemeClr val="dk1"/>
-            </a:effectRef>
-            <a:fontRef idx="minor">
-              <a:schemeClr val="tx1"/>
-            </a:fontRef>
-          </p:style>
-        </p:cxnSp>
-      </p:grpSp>
-    </p:spTree>
-    <p:extLst>
-      <p:ext uri="{BB962C8B-B14F-4D97-AF65-F5344CB8AC3E}">
-        <p14:creationId xmlns:p14="http://schemas.microsoft.com/office/powerpoint/2010/main" val="1180342296"/>
-      </p:ext>
-    </p:extLst>
-  </p:cSld>
-  <p:clrMapOvr>
-    <a:masterClrMapping/>
-  </p:clrMapOvr>
-</p:sld>
-</file>
-
-<file path=ppt/slides/slide20.xml><?xml version="1.0" encoding="utf-8"?>
+<file path=ppt/slides/slide21.xml><?xml version="1.0" encoding="utf-8"?>
 <p:sld xmlns:a="http://schemas.openxmlformats.org/drawingml/2006/main" xmlns:r="http://schemas.openxmlformats.org/officeDocument/2006/relationships" xmlns:p="http://schemas.openxmlformats.org/presentationml/2006/main">
   <p:cSld>
     <p:spTree>
@@ -31223,7 +33285,7 @@
 </p:sld>
 </file>
 
-<file path=ppt/slides/slide21.xml><?xml version="1.0" encoding="utf-8"?>
+<file path=ppt/slides/slide22.xml><?xml version="1.0" encoding="utf-8"?>
 <p:sld xmlns:a="http://schemas.openxmlformats.org/drawingml/2006/main" xmlns:r="http://schemas.openxmlformats.org/officeDocument/2006/relationships" xmlns:p="http://schemas.openxmlformats.org/presentationml/2006/main">
   <p:cSld>
     <p:spTree>
@@ -32343,7 +34405,7 @@
 </p:sld>
 </file>
 
-<file path=ppt/slides/slide22.xml><?xml version="1.0" encoding="utf-8"?>
+<file path=ppt/slides/slide23.xml><?xml version="1.0" encoding="utf-8"?>
 <p:sld xmlns:a="http://schemas.openxmlformats.org/drawingml/2006/main" xmlns:r="http://schemas.openxmlformats.org/officeDocument/2006/relationships" xmlns:p="http://schemas.openxmlformats.org/presentationml/2006/main">
   <p:cSld>
     <p:spTree>
@@ -34435,7 +36497,7 @@
 </p:sld>
 </file>
 
-<file path=ppt/slides/slide23.xml><?xml version="1.0" encoding="utf-8"?>
+<file path=ppt/slides/slide24.xml><?xml version="1.0" encoding="utf-8"?>
 <p:sld xmlns:a="http://schemas.openxmlformats.org/drawingml/2006/main" xmlns:r="http://schemas.openxmlformats.org/officeDocument/2006/relationships" xmlns:p="http://schemas.openxmlformats.org/presentationml/2006/main">
   <p:cSld>
     <p:spTree>
@@ -35856,7 +37918,7 @@
 </p:sld>
 </file>
 
-<file path=ppt/slides/slide24.xml><?xml version="1.0" encoding="utf-8"?>
+<file path=ppt/slides/slide25.xml><?xml version="1.0" encoding="utf-8"?>
 <p:sld xmlns:a="http://schemas.openxmlformats.org/drawingml/2006/main" xmlns:r="http://schemas.openxmlformats.org/officeDocument/2006/relationships" xmlns:p="http://schemas.openxmlformats.org/presentationml/2006/main">
   <p:cSld>
     <p:spTree>
@@ -36620,7 +38682,7 @@
 </p:sld>
 </file>
 
-<file path=ppt/slides/slide25.xml><?xml version="1.0" encoding="utf-8"?>
+<file path=ppt/slides/slide26.xml><?xml version="1.0" encoding="utf-8"?>
 <p:sld xmlns:a="http://schemas.openxmlformats.org/drawingml/2006/main" xmlns:r="http://schemas.openxmlformats.org/officeDocument/2006/relationships" xmlns:p="http://schemas.openxmlformats.org/presentationml/2006/main">
   <p:cSld>
     <p:spTree>
@@ -37446,7 +39508,7 @@
 </p:sld>
 </file>
 
-<file path=ppt/slides/slide26.xml><?xml version="1.0" encoding="utf-8"?>
+<file path=ppt/slides/slide27.xml><?xml version="1.0" encoding="utf-8"?>
 <p:sld xmlns:a="http://schemas.openxmlformats.org/drawingml/2006/main" xmlns:r="http://schemas.openxmlformats.org/officeDocument/2006/relationships" xmlns:p="http://schemas.openxmlformats.org/presentationml/2006/main">
   <p:cSld>
     <p:spTree>
@@ -38231,7 +40293,7 @@
 </p:sld>
 </file>
 
-<file path=ppt/slides/slide27.xml><?xml version="1.0" encoding="utf-8"?>
+<file path=ppt/slides/slide28.xml><?xml version="1.0" encoding="utf-8"?>
 <p:sld xmlns:a="http://schemas.openxmlformats.org/drawingml/2006/main" xmlns:r="http://schemas.openxmlformats.org/officeDocument/2006/relationships" xmlns:p="http://schemas.openxmlformats.org/presentationml/2006/main">
   <p:cSld>
     <p:spTree>
@@ -38861,7 +40923,7 @@
 </p:sld>
 </file>
 
-<file path=ppt/slides/slide28.xml><?xml version="1.0" encoding="utf-8"?>
+<file path=ppt/slides/slide29.xml><?xml version="1.0" encoding="utf-8"?>
 <p:sld xmlns:a="http://schemas.openxmlformats.org/drawingml/2006/main" xmlns:r="http://schemas.openxmlformats.org/officeDocument/2006/relationships" xmlns:p="http://schemas.openxmlformats.org/presentationml/2006/main">
   <p:cSld>
     <p:spTree>
@@ -41823,8 +43885,8 @@
             </a:prstGeom>
           </p:spPr>
         </p:pic>
-        <mc:AlternateContent xmlns:mc="http://schemas.openxmlformats.org/markup-compatibility/2006">
-          <mc:Choice xmlns:a14="http://schemas.microsoft.com/office/drawing/2010/main" Requires="a14">
+        <mc:AlternateContent xmlns:mc="http://schemas.openxmlformats.org/markup-compatibility/2006" xmlns:a14="http://schemas.microsoft.com/office/drawing/2010/main">
+          <mc:Choice Requires="a14">
             <p:sp>
               <p:nvSpPr>
                 <p:cNvPr id="6" name="CasellaDiTesto 5">
@@ -41907,7 +43969,7 @@
               </p:txBody>
             </p:sp>
           </mc:Choice>
-          <mc:Fallback>
+          <mc:Fallback xmlns="">
             <p:sp>
               <p:nvSpPr>
                 <p:cNvPr id="6" name="CasellaDiTesto 5">
@@ -41955,8 +44017,8 @@
             </p:sp>
           </mc:Fallback>
         </mc:AlternateContent>
-        <mc:AlternateContent xmlns:mc="http://schemas.openxmlformats.org/markup-compatibility/2006">
-          <mc:Choice xmlns:a14="http://schemas.microsoft.com/office/drawing/2010/main" Requires="a14">
+        <mc:AlternateContent xmlns:mc="http://schemas.openxmlformats.org/markup-compatibility/2006" xmlns:a14="http://schemas.microsoft.com/office/drawing/2010/main">
+          <mc:Choice Requires="a14">
             <p:sp>
               <p:nvSpPr>
                 <p:cNvPr id="7" name="CasellaDiTesto 6">
@@ -42039,7 +44101,7 @@
               </p:txBody>
             </p:sp>
           </mc:Choice>
-          <mc:Fallback>
+          <mc:Fallback xmlns="">
             <p:sp>
               <p:nvSpPr>
                 <p:cNvPr id="7" name="CasellaDiTesto 6">
@@ -42087,8 +44149,8 @@
             </p:sp>
           </mc:Fallback>
         </mc:AlternateContent>
-        <mc:AlternateContent xmlns:mc="http://schemas.openxmlformats.org/markup-compatibility/2006">
-          <mc:Choice xmlns:a14="http://schemas.microsoft.com/office/drawing/2010/main" Requires="a14">
+        <mc:AlternateContent xmlns:mc="http://schemas.openxmlformats.org/markup-compatibility/2006" xmlns:a14="http://schemas.microsoft.com/office/drawing/2010/main">
+          <mc:Choice Requires="a14">
             <p:sp>
               <p:nvSpPr>
                 <p:cNvPr id="8" name="CasellaDiTesto 7">
@@ -42171,7 +44233,7 @@
               </p:txBody>
             </p:sp>
           </mc:Choice>
-          <mc:Fallback>
+          <mc:Fallback xmlns="">
             <p:sp>
               <p:nvSpPr>
                 <p:cNvPr id="8" name="CasellaDiTesto 7">

</xml_diff>